<commit_message>
[MEL - 0002] - Adjusting values presentation
</commit_message>
<xml_diff>
--- a/Presentations/NegativeVisualization.pptx
+++ b/Presentations/NegativeVisualization.pptx
@@ -5,22 +5,24 @@
     <p:sldMasterId id="2147483648" r:id="rId1"/>
   </p:sldMasterIdLst>
   <p:notesMasterIdLst>
-    <p:notesMasterId r:id="rId15"/>
+    <p:notesMasterId r:id="rId17"/>
   </p:notesMasterIdLst>
   <p:sldIdLst>
-    <p:sldId id="315" r:id="rId2"/>
-    <p:sldId id="354" r:id="rId3"/>
-    <p:sldId id="341" r:id="rId4"/>
-    <p:sldId id="342" r:id="rId5"/>
-    <p:sldId id="343" r:id="rId6"/>
-    <p:sldId id="345" r:id="rId7"/>
-    <p:sldId id="347" r:id="rId8"/>
-    <p:sldId id="348" r:id="rId9"/>
-    <p:sldId id="349" r:id="rId10"/>
-    <p:sldId id="350" r:id="rId11"/>
-    <p:sldId id="352" r:id="rId12"/>
-    <p:sldId id="351" r:id="rId13"/>
-    <p:sldId id="353" r:id="rId14"/>
+    <p:sldId id="355" r:id="rId2"/>
+    <p:sldId id="315" r:id="rId3"/>
+    <p:sldId id="354" r:id="rId4"/>
+    <p:sldId id="341" r:id="rId5"/>
+    <p:sldId id="342" r:id="rId6"/>
+    <p:sldId id="343" r:id="rId7"/>
+    <p:sldId id="345" r:id="rId8"/>
+    <p:sldId id="347" r:id="rId9"/>
+    <p:sldId id="348" r:id="rId10"/>
+    <p:sldId id="349" r:id="rId11"/>
+    <p:sldId id="350" r:id="rId12"/>
+    <p:sldId id="352" r:id="rId13"/>
+    <p:sldId id="351" r:id="rId14"/>
+    <p:sldId id="353" r:id="rId15"/>
+    <p:sldId id="356" r:id="rId16"/>
   </p:sldIdLst>
   <p:sldSz cx="12192000" cy="6858000"/>
   <p:notesSz cx="6858000" cy="9144000"/>
@@ -209,7 +211,7 @@
           <a:p>
             <a:fld id="{BE922CAB-3410-47F5-A79E-CF5894AF3626}" type="datetimeFigureOut">
               <a:rPr lang="pt-PT" smtClean="0"/>
-              <a:t>28/07/2020</a:t>
+              <a:t>29/07/2020</a:t>
             </a:fld>
             <a:endParaRPr lang="pt-PT"/>
           </a:p>
@@ -368,7 +370,7 @@
           <a:p>
             <a:fld id="{A3A1918A-EBEF-4566-AEC8-1165858BF98D}" type="slidenum">
               <a:rPr lang="pt-PT" smtClean="0"/>
-              <a:t>‹nº›</a:t>
+              <a:t>‹#›</a:t>
             </a:fld>
             <a:endParaRPr lang="pt-PT"/>
           </a:p>
@@ -626,7 +628,7 @@
           <a:p>
             <a:fld id="{A18E2B5E-2BAC-408C-9D01-DD90C7E8DCBE}" type="datetimeFigureOut">
               <a:rPr lang="pt-PT" smtClean="0"/>
-              <a:t>28/07/2020</a:t>
+              <a:t>29/07/2020</a:t>
             </a:fld>
             <a:endParaRPr lang="pt-PT"/>
           </a:p>
@@ -680,7 +682,7 @@
           <a:p>
             <a:fld id="{F626F722-DB2D-45A8-8D9B-2FEA8CFC5936}" type="slidenum">
               <a:rPr lang="pt-PT" smtClean="0"/>
-              <a:t>‹nº›</a:t>
+              <a:t>‹#›</a:t>
             </a:fld>
             <a:endParaRPr lang="pt-PT"/>
           </a:p>
@@ -838,7 +840,7 @@
           <a:p>
             <a:fld id="{A18E2B5E-2BAC-408C-9D01-DD90C7E8DCBE}" type="datetimeFigureOut">
               <a:rPr lang="pt-PT" smtClean="0"/>
-              <a:t>28/07/2020</a:t>
+              <a:t>29/07/2020</a:t>
             </a:fld>
             <a:endParaRPr lang="pt-PT"/>
           </a:p>
@@ -892,7 +894,7 @@
           <a:p>
             <a:fld id="{F626F722-DB2D-45A8-8D9B-2FEA8CFC5936}" type="slidenum">
               <a:rPr lang="pt-PT" smtClean="0"/>
-              <a:t>‹nº›</a:t>
+              <a:t>‹#›</a:t>
             </a:fld>
             <a:endParaRPr lang="pt-PT"/>
           </a:p>
@@ -1060,7 +1062,7 @@
           <a:p>
             <a:fld id="{A18E2B5E-2BAC-408C-9D01-DD90C7E8DCBE}" type="datetimeFigureOut">
               <a:rPr lang="pt-PT" smtClean="0"/>
-              <a:t>28/07/2020</a:t>
+              <a:t>29/07/2020</a:t>
             </a:fld>
             <a:endParaRPr lang="pt-PT"/>
           </a:p>
@@ -1114,7 +1116,7 @@
           <a:p>
             <a:fld id="{F626F722-DB2D-45A8-8D9B-2FEA8CFC5936}" type="slidenum">
               <a:rPr lang="pt-PT" smtClean="0"/>
-              <a:t>‹nº›</a:t>
+              <a:t>‹#›</a:t>
             </a:fld>
             <a:endParaRPr lang="pt-PT"/>
           </a:p>
@@ -1272,7 +1274,7 @@
           <a:p>
             <a:fld id="{A18E2B5E-2BAC-408C-9D01-DD90C7E8DCBE}" type="datetimeFigureOut">
               <a:rPr lang="pt-PT" smtClean="0"/>
-              <a:t>28/07/2020</a:t>
+              <a:t>29/07/2020</a:t>
             </a:fld>
             <a:endParaRPr lang="pt-PT"/>
           </a:p>
@@ -1326,7 +1328,7 @@
           <a:p>
             <a:fld id="{F626F722-DB2D-45A8-8D9B-2FEA8CFC5936}" type="slidenum">
               <a:rPr lang="pt-PT" smtClean="0"/>
-              <a:t>‹nº›</a:t>
+              <a:t>‹#›</a:t>
             </a:fld>
             <a:endParaRPr lang="pt-PT"/>
           </a:p>
@@ -1560,7 +1562,7 @@
           <a:p>
             <a:fld id="{A18E2B5E-2BAC-408C-9D01-DD90C7E8DCBE}" type="datetimeFigureOut">
               <a:rPr lang="pt-PT" smtClean="0"/>
-              <a:t>28/07/2020</a:t>
+              <a:t>29/07/2020</a:t>
             </a:fld>
             <a:endParaRPr lang="pt-PT"/>
           </a:p>
@@ -1614,7 +1616,7 @@
           <a:p>
             <a:fld id="{F626F722-DB2D-45A8-8D9B-2FEA8CFC5936}" type="slidenum">
               <a:rPr lang="pt-PT" smtClean="0"/>
-              <a:t>‹nº›</a:t>
+              <a:t>‹#›</a:t>
             </a:fld>
             <a:endParaRPr lang="pt-PT"/>
           </a:p>
@@ -1840,7 +1842,7 @@
           <a:p>
             <a:fld id="{A18E2B5E-2BAC-408C-9D01-DD90C7E8DCBE}" type="datetimeFigureOut">
               <a:rPr lang="pt-PT" smtClean="0"/>
-              <a:t>28/07/2020</a:t>
+              <a:t>29/07/2020</a:t>
             </a:fld>
             <a:endParaRPr lang="pt-PT"/>
           </a:p>
@@ -1894,7 +1896,7 @@
           <a:p>
             <a:fld id="{F626F722-DB2D-45A8-8D9B-2FEA8CFC5936}" type="slidenum">
               <a:rPr lang="pt-PT" smtClean="0"/>
-              <a:t>‹nº›</a:t>
+              <a:t>‹#›</a:t>
             </a:fld>
             <a:endParaRPr lang="pt-PT"/>
           </a:p>
@@ -2267,7 +2269,7 @@
           <a:p>
             <a:fld id="{A18E2B5E-2BAC-408C-9D01-DD90C7E8DCBE}" type="datetimeFigureOut">
               <a:rPr lang="pt-PT" smtClean="0"/>
-              <a:t>28/07/2020</a:t>
+              <a:t>29/07/2020</a:t>
             </a:fld>
             <a:endParaRPr lang="pt-PT"/>
           </a:p>
@@ -2321,7 +2323,7 @@
           <a:p>
             <a:fld id="{F626F722-DB2D-45A8-8D9B-2FEA8CFC5936}" type="slidenum">
               <a:rPr lang="pt-PT" smtClean="0"/>
-              <a:t>‹nº›</a:t>
+              <a:t>‹#›</a:t>
             </a:fld>
             <a:endParaRPr lang="pt-PT"/>
           </a:p>
@@ -2421,7 +2423,7 @@
           <a:p>
             <a:fld id="{A18E2B5E-2BAC-408C-9D01-DD90C7E8DCBE}" type="datetimeFigureOut">
               <a:rPr lang="pt-PT" smtClean="0"/>
-              <a:t>28/07/2020</a:t>
+              <a:t>29/07/2020</a:t>
             </a:fld>
             <a:endParaRPr lang="pt-PT"/>
           </a:p>
@@ -2475,7 +2477,7 @@
           <a:p>
             <a:fld id="{F626F722-DB2D-45A8-8D9B-2FEA8CFC5936}" type="slidenum">
               <a:rPr lang="pt-PT" smtClean="0"/>
-              <a:t>‹nº›</a:t>
+              <a:t>‹#›</a:t>
             </a:fld>
             <a:endParaRPr lang="pt-PT"/>
           </a:p>
@@ -2546,7 +2548,7 @@
           <a:p>
             <a:fld id="{A18E2B5E-2BAC-408C-9D01-DD90C7E8DCBE}" type="datetimeFigureOut">
               <a:rPr lang="pt-PT" smtClean="0"/>
-              <a:t>28/07/2020</a:t>
+              <a:t>29/07/2020</a:t>
             </a:fld>
             <a:endParaRPr lang="pt-PT"/>
           </a:p>
@@ -2600,7 +2602,7 @@
           <a:p>
             <a:fld id="{F626F722-DB2D-45A8-8D9B-2FEA8CFC5936}" type="slidenum">
               <a:rPr lang="pt-PT" smtClean="0"/>
-              <a:t>‹nº›</a:t>
+              <a:t>‹#›</a:t>
             </a:fld>
             <a:endParaRPr lang="pt-PT"/>
           </a:p>
@@ -2871,7 +2873,7 @@
           <a:p>
             <a:fld id="{A18E2B5E-2BAC-408C-9D01-DD90C7E8DCBE}" type="datetimeFigureOut">
               <a:rPr lang="pt-PT" smtClean="0"/>
-              <a:t>28/07/2020</a:t>
+              <a:t>29/07/2020</a:t>
             </a:fld>
             <a:endParaRPr lang="pt-PT"/>
           </a:p>
@@ -2925,7 +2927,7 @@
           <a:p>
             <a:fld id="{F626F722-DB2D-45A8-8D9B-2FEA8CFC5936}" type="slidenum">
               <a:rPr lang="pt-PT" smtClean="0"/>
-              <a:t>‹nº›</a:t>
+              <a:t>‹#›</a:t>
             </a:fld>
             <a:endParaRPr lang="pt-PT"/>
           </a:p>
@@ -3172,7 +3174,7 @@
           <a:p>
             <a:fld id="{A18E2B5E-2BAC-408C-9D01-DD90C7E8DCBE}" type="datetimeFigureOut">
               <a:rPr lang="pt-PT" smtClean="0"/>
-              <a:t>28/07/2020</a:t>
+              <a:t>29/07/2020</a:t>
             </a:fld>
             <a:endParaRPr lang="pt-PT"/>
           </a:p>
@@ -3226,7 +3228,7 @@
           <a:p>
             <a:fld id="{F626F722-DB2D-45A8-8D9B-2FEA8CFC5936}" type="slidenum">
               <a:rPr lang="pt-PT" smtClean="0"/>
-              <a:t>‹nº›</a:t>
+              <a:t>‹#›</a:t>
             </a:fld>
             <a:endParaRPr lang="pt-PT"/>
           </a:p>
@@ -3427,7 +3429,7 @@
           <a:p>
             <a:fld id="{A18E2B5E-2BAC-408C-9D01-DD90C7E8DCBE}" type="datetimeFigureOut">
               <a:rPr lang="pt-PT" smtClean="0"/>
-              <a:t>28/07/2020</a:t>
+              <a:t>29/07/2020</a:t>
             </a:fld>
             <a:endParaRPr lang="pt-PT"/>
           </a:p>
@@ -3517,7 +3519,7 @@
           <a:p>
             <a:fld id="{F626F722-DB2D-45A8-8D9B-2FEA8CFC5936}" type="slidenum">
               <a:rPr lang="pt-PT" smtClean="0"/>
-              <a:t>‹nº›</a:t>
+              <a:t>‹#›</a:t>
             </a:fld>
             <a:endParaRPr lang="pt-PT"/>
           </a:p>
@@ -3856,12 +3858,301 @@
           <a:chExt cx="0" cy="0"/>
         </a:xfrm>
       </p:grpSpPr>
+    </p:spTree>
+    <p:extLst>
+      <p:ext uri="{BB962C8B-B14F-4D97-AF65-F5344CB8AC3E}">
+        <p14:creationId xmlns:p14="http://schemas.microsoft.com/office/powerpoint/2010/main" val="4139299410"/>
+      </p:ext>
+    </p:extLst>
+  </p:cSld>
+  <p:clrMapOvr>
+    <a:masterClrMapping/>
+  </p:clrMapOvr>
+  <mc:AlternateContent xmlns:mc="http://schemas.openxmlformats.org/markup-compatibility/2006" xmlns:p15="http://schemas.microsoft.com/office/powerpoint/2012/main">
+    <mc:Choice Requires="p15">
+      <p:transition xmlns:p14="http://schemas.microsoft.com/office/powerpoint/2010/main" spd="slow" p14:dur="1250">
+        <p15:prstTrans prst="peelOff"/>
+      </p:transition>
+    </mc:Choice>
+    <mc:Fallback xmlns="">
+      <p:transition spd="slow">
+        <p:fade/>
+      </p:transition>
+    </mc:Fallback>
+  </mc:AlternateContent>
+</p:sld>
+</file>
+
+<file path=ppt/slides/slide10.xml><?xml version="1.0" encoding="utf-8"?>
+<p:sld xmlns:a="http://schemas.openxmlformats.org/drawingml/2006/main" xmlns:r="http://schemas.openxmlformats.org/officeDocument/2006/relationships" xmlns:p="http://schemas.openxmlformats.org/presentationml/2006/main">
+  <p:cSld>
+    <p:spTree>
+      <p:nvGrpSpPr>
+        <p:cNvPr id="1" name=""/>
+        <p:cNvGrpSpPr/>
+        <p:nvPr/>
+      </p:nvGrpSpPr>
+      <p:grpSpPr>
+        <a:xfrm>
+          <a:off x="0" y="0"/>
+          <a:ext cx="0" cy="0"/>
+          <a:chOff x="0" y="0"/>
+          <a:chExt cx="0" cy="0"/>
+        </a:xfrm>
+      </p:grpSpPr>
+      <p:sp>
+        <p:nvSpPr>
+          <p:cNvPr id="4" name="Background">
+            <a:extLst>
+              <a:ext uri="{FF2B5EF4-FFF2-40B4-BE49-F238E27FC236}">
+                <a16:creationId xmlns:a16="http://schemas.microsoft.com/office/drawing/2014/main" id="{58EE32A2-4065-49BB-8274-A9F2040B80A3}"/>
+              </a:ext>
+            </a:extLst>
+          </p:cNvPr>
+          <p:cNvSpPr/>
+          <p:nvPr/>
+        </p:nvSpPr>
+        <p:spPr>
+          <a:xfrm>
+            <a:off x="0" y="0"/>
+            <a:ext cx="12192000" cy="6858000"/>
+          </a:xfrm>
+          <a:prstGeom prst="rect">
+            <a:avLst/>
+          </a:prstGeom>
+          <a:solidFill>
+            <a:srgbClr val="49BB90"/>
+          </a:solidFill>
+          <a:ln>
+            <a:noFill/>
+          </a:ln>
+        </p:spPr>
+        <p:style>
+          <a:lnRef idx="2">
+            <a:schemeClr val="accent1">
+              <a:shade val="50000"/>
+            </a:schemeClr>
+          </a:lnRef>
+          <a:fillRef idx="1">
+            <a:schemeClr val="accent1"/>
+          </a:fillRef>
+          <a:effectRef idx="0">
+            <a:schemeClr val="accent1"/>
+          </a:effectRef>
+          <a:fontRef idx="minor">
+            <a:schemeClr val="lt1"/>
+          </a:fontRef>
+        </p:style>
+        <p:txBody>
+          <a:bodyPr rtlCol="0" anchor="ctr"/>
+          <a:lstStyle/>
+          <a:p>
+            <a:pPr algn="ctr"/>
+            <a:endParaRPr lang="pt-PT"/>
+          </a:p>
+        </p:txBody>
+      </p:sp>
       <p:pic>
         <p:nvPicPr>
-          <p:cNvPr id="7" name="Spiral">
+          <p:cNvPr id="9" name="Face">
             <a:extLst>
               <a:ext uri="{FF2B5EF4-FFF2-40B4-BE49-F238E27FC236}">
-                <a16:creationId xmlns:a16="http://schemas.microsoft.com/office/drawing/2014/main" id="{C4178F1A-925E-480C-8DAF-A3F940931ACA}"/>
+                <a16:creationId xmlns:a16="http://schemas.microsoft.com/office/drawing/2014/main" id="{A147DBF8-885F-41F1-85A4-D3FE881FD47A}"/>
+              </a:ext>
+            </a:extLst>
+          </p:cNvPr>
+          <p:cNvPicPr>
+            <a:picLocks noChangeAspect="1"/>
+          </p:cNvPicPr>
+          <p:nvPr/>
+        </p:nvPicPr>
+        <p:blipFill>
+          <a:blip r:embed="rId2">
+            <a:extLst>
+              <a:ext uri="{28A0092B-C50C-407E-A947-70E740481C1C}">
+                <a14:useLocalDpi xmlns:a14="http://schemas.microsoft.com/office/drawing/2010/main" val="0"/>
+              </a:ext>
+              <a:ext uri="{96DAC541-7B7A-43D3-8B79-37D633B846F1}">
+                <asvg:svgBlip xmlns:asvg="http://schemas.microsoft.com/office/drawing/2016/SVG/main" r:embed="rId3"/>
+              </a:ext>
+            </a:extLst>
+          </a:blip>
+          <a:stretch>
+            <a:fillRect/>
+          </a:stretch>
+        </p:blipFill>
+        <p:spPr>
+          <a:xfrm flipH="1">
+            <a:off x="1718642" y="0"/>
+            <a:ext cx="8185166" cy="8185166"/>
+          </a:xfrm>
+          <a:prstGeom prst="rect">
+            <a:avLst/>
+          </a:prstGeom>
+          <a:effectLst>
+            <a:outerShdw blurRad="63500" sx="102000" sy="102000" algn="ctr" rotWithShape="0">
+              <a:prstClr val="black">
+                <a:alpha val="40000"/>
+              </a:prstClr>
+            </a:outerShdw>
+          </a:effectLst>
+        </p:spPr>
+      </p:pic>
+      <p:sp>
+        <p:nvSpPr>
+          <p:cNvPr id="10" name="Mouth">
+            <a:extLst>
+              <a:ext uri="{FF2B5EF4-FFF2-40B4-BE49-F238E27FC236}">
+                <a16:creationId xmlns:a16="http://schemas.microsoft.com/office/drawing/2014/main" id="{479A10FF-AB80-428F-9DCA-4A99B62F2B50}"/>
+              </a:ext>
+            </a:extLst>
+          </p:cNvPr>
+          <p:cNvSpPr/>
+          <p:nvPr/>
+        </p:nvSpPr>
+        <p:spPr>
+          <a:xfrm>
+            <a:off x="5273702" y="5116437"/>
+            <a:ext cx="265963" cy="260170"/>
+          </a:xfrm>
+          <a:prstGeom prst="ellipse">
+            <a:avLst/>
+          </a:prstGeom>
+          <a:solidFill>
+            <a:srgbClr val="14110D"/>
+          </a:solidFill>
+          <a:ln>
+            <a:noFill/>
+          </a:ln>
+        </p:spPr>
+        <p:style>
+          <a:lnRef idx="2">
+            <a:schemeClr val="accent1">
+              <a:shade val="50000"/>
+            </a:schemeClr>
+          </a:lnRef>
+          <a:fillRef idx="1">
+            <a:schemeClr val="accent1"/>
+          </a:fillRef>
+          <a:effectRef idx="0">
+            <a:schemeClr val="accent1"/>
+          </a:effectRef>
+          <a:fontRef idx="minor">
+            <a:schemeClr val="lt1"/>
+          </a:fontRef>
+        </p:style>
+        <p:txBody>
+          <a:bodyPr rtlCol="0" anchor="ctr"/>
+          <a:lstStyle/>
+          <a:p>
+            <a:pPr algn="ctr"/>
+            <a:endParaRPr lang="pt-PT" dirty="0"/>
+          </a:p>
+        </p:txBody>
+      </p:sp>
+      <p:grpSp>
+        <p:nvGrpSpPr>
+          <p:cNvPr id="11" name="eyebrow">
+            <a:extLst>
+              <a:ext uri="{FF2B5EF4-FFF2-40B4-BE49-F238E27FC236}">
+                <a16:creationId xmlns:a16="http://schemas.microsoft.com/office/drawing/2014/main" id="{CAB9674F-9382-4745-B347-9AB9BBED81F9}"/>
+              </a:ext>
+            </a:extLst>
+          </p:cNvPr>
+          <p:cNvGrpSpPr/>
+          <p:nvPr/>
+        </p:nvGrpSpPr>
+        <p:grpSpPr>
+          <a:xfrm>
+            <a:off x="3662802" y="2611664"/>
+            <a:ext cx="3485494" cy="658589"/>
+            <a:chOff x="4940300" y="3208427"/>
+            <a:chExt cx="2513228" cy="423773"/>
+          </a:xfrm>
+        </p:grpSpPr>
+        <p:pic>
+          <p:nvPicPr>
+            <p:cNvPr id="13" name="Graphic 12">
+              <a:extLst>
+                <a:ext uri="{FF2B5EF4-FFF2-40B4-BE49-F238E27FC236}">
+                  <a16:creationId xmlns:a16="http://schemas.microsoft.com/office/drawing/2014/main" id="{B0EF9019-F6EA-4A42-A3CC-E51C005476E3}"/>
+                </a:ext>
+              </a:extLst>
+            </p:cNvPr>
+            <p:cNvPicPr>
+              <a:picLocks noChangeAspect="1"/>
+            </p:cNvPicPr>
+            <p:nvPr/>
+          </p:nvPicPr>
+          <p:blipFill rotWithShape="1">
+            <a:blip r:embed="rId4">
+              <a:extLst>
+                <a:ext uri="{28A0092B-C50C-407E-A947-70E740481C1C}">
+                  <a14:useLocalDpi xmlns:a14="http://schemas.microsoft.com/office/drawing/2010/main" val="0"/>
+                </a:ext>
+                <a:ext uri="{96DAC541-7B7A-43D3-8B79-37D633B846F1}">
+                  <asvg:svgBlip xmlns:asvg="http://schemas.microsoft.com/office/drawing/2016/SVG/main" r:embed="rId5"/>
+                </a:ext>
+              </a:extLst>
+            </a:blip>
+            <a:srcRect l="38612" t="40175" r="40437" b="52820"/>
+            <a:stretch/>
+          </p:blipFill>
+          <p:spPr>
+            <a:xfrm rot="20126851">
+              <a:off x="4940300" y="3263900"/>
+              <a:ext cx="1101551" cy="368300"/>
+            </a:xfrm>
+            <a:prstGeom prst="rect">
+              <a:avLst/>
+            </a:prstGeom>
+          </p:spPr>
+        </p:pic>
+        <p:pic>
+          <p:nvPicPr>
+            <p:cNvPr id="15" name="Graphic 22">
+              <a:extLst>
+                <a:ext uri="{FF2B5EF4-FFF2-40B4-BE49-F238E27FC236}">
+                  <a16:creationId xmlns:a16="http://schemas.microsoft.com/office/drawing/2014/main" id="{E86EE59C-813A-4C9A-8F13-203F9AA4BFF1}"/>
+                </a:ext>
+              </a:extLst>
+            </p:cNvPr>
+            <p:cNvPicPr>
+              <a:picLocks noChangeAspect="1"/>
+            </p:cNvPicPr>
+            <p:nvPr/>
+          </p:nvPicPr>
+          <p:blipFill rotWithShape="1">
+            <a:blip r:embed="rId4">
+              <a:extLst>
+                <a:ext uri="{28A0092B-C50C-407E-A947-70E740481C1C}">
+                  <a14:useLocalDpi xmlns:a14="http://schemas.microsoft.com/office/drawing/2010/main" val="0"/>
+                </a:ext>
+                <a:ext uri="{96DAC541-7B7A-43D3-8B79-37D633B846F1}">
+                  <asvg:svgBlip xmlns:asvg="http://schemas.microsoft.com/office/drawing/2016/SVG/main" r:embed="rId5"/>
+                </a:ext>
+              </a:extLst>
+            </a:blip>
+            <a:srcRect l="38612" t="40175" r="40437" b="52820"/>
+            <a:stretch/>
+          </p:blipFill>
+          <p:spPr>
+            <a:xfrm rot="2036532">
+              <a:off x="6351977" y="3208427"/>
+              <a:ext cx="1101551" cy="368300"/>
+            </a:xfrm>
+            <a:prstGeom prst="rect">
+              <a:avLst/>
+            </a:prstGeom>
+          </p:spPr>
+        </p:pic>
+      </p:grpSp>
+      <p:pic>
+        <p:nvPicPr>
+          <p:cNvPr id="7" name="Graphic 6">
+            <a:extLst>
+              <a:ext uri="{FF2B5EF4-FFF2-40B4-BE49-F238E27FC236}">
+                <a16:creationId xmlns:a16="http://schemas.microsoft.com/office/drawing/2014/main" id="{8B4C4773-E22D-4E43-9776-A2A52E23B523}"/>
               </a:ext>
             </a:extLst>
           </p:cNvPr>
@@ -3871,23 +4162,23 @@
           <p:nvPr/>
         </p:nvPicPr>
         <p:blipFill rotWithShape="1">
-          <a:blip r:embed="rId2">
+          <a:blip r:embed="rId6">
             <a:extLst>
               <a:ext uri="{28A0092B-C50C-407E-A947-70E740481C1C}">
                 <a14:useLocalDpi xmlns:a14="http://schemas.microsoft.com/office/drawing/2010/main" val="0"/>
               </a:ext>
               <a:ext uri="{96DAC541-7B7A-43D3-8B79-37D633B846F1}">
-                <asvg:svgBlip xmlns:asvg="http://schemas.microsoft.com/office/drawing/2016/SVG/main" r:embed="rId3"/>
+                <asvg:svgBlip xmlns:asvg="http://schemas.microsoft.com/office/drawing/2016/SVG/main" r:embed="rId7"/>
               </a:ext>
             </a:extLst>
           </a:blip>
-          <a:srcRect l="32493" t="24550" r="30996" b="25503"/>
+          <a:srcRect l="34676" t="13699" r="33814" b="12877"/>
           <a:stretch/>
         </p:blipFill>
         <p:spPr>
           <a:xfrm>
-            <a:off x="-1455174" y="-3874593"/>
-            <a:ext cx="15102347" cy="14607186"/>
+            <a:off x="3511108" y="3429000"/>
+            <a:ext cx="287389" cy="473485"/>
           </a:xfrm>
           <a:prstGeom prst="rect">
             <a:avLst/>
@@ -3896,10 +4187,10 @@
       </p:pic>
       <p:pic>
         <p:nvPicPr>
-          <p:cNvPr id="5" name="Clock">
+          <p:cNvPr id="12" name="Graphic 11">
             <a:extLst>
               <a:ext uri="{FF2B5EF4-FFF2-40B4-BE49-F238E27FC236}">
-                <a16:creationId xmlns:a16="http://schemas.microsoft.com/office/drawing/2014/main" id="{0CFEE4A3-D9EB-497D-87D4-0BB775172CC4}"/>
+                <a16:creationId xmlns:a16="http://schemas.microsoft.com/office/drawing/2014/main" id="{FE311968-F3FA-4E5E-8594-0D81D403C39E}"/>
               </a:ext>
             </a:extLst>
           </p:cNvPr>
@@ -3908,25 +4199,176 @@
           </p:cNvPicPr>
           <p:nvPr/>
         </p:nvPicPr>
-        <p:blipFill>
-          <a:blip r:embed="rId4">
+        <p:blipFill rotWithShape="1">
+          <a:blip r:embed="rId6">
             <a:extLst>
               <a:ext uri="{28A0092B-C50C-407E-A947-70E740481C1C}">
                 <a14:useLocalDpi xmlns:a14="http://schemas.microsoft.com/office/drawing/2010/main" val="0"/>
               </a:ext>
               <a:ext uri="{96DAC541-7B7A-43D3-8B79-37D633B846F1}">
-                <asvg:svgBlip xmlns:asvg="http://schemas.microsoft.com/office/drawing/2016/SVG/main" r:embed="rId5"/>
+                <asvg:svgBlip xmlns:asvg="http://schemas.microsoft.com/office/drawing/2016/SVG/main" r:embed="rId7"/>
               </a:ext>
             </a:extLst>
           </a:blip>
-          <a:stretch>
-            <a:fillRect/>
-          </a:stretch>
+          <a:srcRect l="34676" t="13699" r="33814" b="12877"/>
+          <a:stretch/>
         </p:blipFill>
         <p:spPr>
           <a:xfrm>
-            <a:off x="1246168" y="0"/>
-            <a:ext cx="9699665" cy="6858000"/>
+            <a:off x="5300125" y="2661110"/>
+            <a:ext cx="287389" cy="473485"/>
+          </a:xfrm>
+          <a:prstGeom prst="rect">
+            <a:avLst/>
+          </a:prstGeom>
+        </p:spPr>
+      </p:pic>
+      <p:pic>
+        <p:nvPicPr>
+          <p:cNvPr id="16" name="Graphic 15">
+            <a:extLst>
+              <a:ext uri="{FF2B5EF4-FFF2-40B4-BE49-F238E27FC236}">
+                <a16:creationId xmlns:a16="http://schemas.microsoft.com/office/drawing/2014/main" id="{32266514-8FDF-455E-8ACB-91477186FC68}"/>
+              </a:ext>
+            </a:extLst>
+          </p:cNvPr>
+          <p:cNvPicPr>
+            <a:picLocks noChangeAspect="1"/>
+          </p:cNvPicPr>
+          <p:nvPr/>
+        </p:nvPicPr>
+        <p:blipFill rotWithShape="1">
+          <a:blip r:embed="rId6">
+            <a:extLst>
+              <a:ext uri="{28A0092B-C50C-407E-A947-70E740481C1C}">
+                <a14:useLocalDpi xmlns:a14="http://schemas.microsoft.com/office/drawing/2010/main" val="0"/>
+              </a:ext>
+              <a:ext uri="{96DAC541-7B7A-43D3-8B79-37D633B846F1}">
+                <asvg:svgBlip xmlns:asvg="http://schemas.microsoft.com/office/drawing/2016/SVG/main" r:embed="rId7"/>
+              </a:ext>
+            </a:extLst>
+          </a:blip>
+          <a:srcRect l="34676" t="13699" r="33814" b="12877"/>
+          <a:stretch/>
+        </p:blipFill>
+        <p:spPr>
+          <a:xfrm>
+            <a:off x="6333164" y="2013339"/>
+            <a:ext cx="287389" cy="473485"/>
+          </a:xfrm>
+          <a:prstGeom prst="rect">
+            <a:avLst/>
+          </a:prstGeom>
+        </p:spPr>
+      </p:pic>
+      <p:pic>
+        <p:nvPicPr>
+          <p:cNvPr id="17" name="Graphic 16">
+            <a:extLst>
+              <a:ext uri="{FF2B5EF4-FFF2-40B4-BE49-F238E27FC236}">
+                <a16:creationId xmlns:a16="http://schemas.microsoft.com/office/drawing/2014/main" id="{1A216963-9529-41A2-9E0F-2DFC06AE364D}"/>
+              </a:ext>
+            </a:extLst>
+          </p:cNvPr>
+          <p:cNvPicPr>
+            <a:picLocks noChangeAspect="1"/>
+          </p:cNvPicPr>
+          <p:nvPr/>
+        </p:nvPicPr>
+        <p:blipFill rotWithShape="1">
+          <a:blip r:embed="rId6">
+            <a:extLst>
+              <a:ext uri="{28A0092B-C50C-407E-A947-70E740481C1C}">
+                <a14:useLocalDpi xmlns:a14="http://schemas.microsoft.com/office/drawing/2010/main" val="0"/>
+              </a:ext>
+              <a:ext uri="{96DAC541-7B7A-43D3-8B79-37D633B846F1}">
+                <asvg:svgBlip xmlns:asvg="http://schemas.microsoft.com/office/drawing/2016/SVG/main" r:embed="rId7"/>
+              </a:ext>
+            </a:extLst>
+          </a:blip>
+          <a:srcRect l="34676" t="13699" r="33814" b="12877"/>
+          <a:stretch/>
+        </p:blipFill>
+        <p:spPr>
+          <a:xfrm>
+            <a:off x="3841349" y="4733143"/>
+            <a:ext cx="287389" cy="473485"/>
+          </a:xfrm>
+          <a:prstGeom prst="rect">
+            <a:avLst/>
+          </a:prstGeom>
+        </p:spPr>
+      </p:pic>
+      <p:pic>
+        <p:nvPicPr>
+          <p:cNvPr id="18" name="Graphic 17">
+            <a:extLst>
+              <a:ext uri="{FF2B5EF4-FFF2-40B4-BE49-F238E27FC236}">
+                <a16:creationId xmlns:a16="http://schemas.microsoft.com/office/drawing/2014/main" id="{4459B258-750A-4EA2-990A-6485888DA122}"/>
+              </a:ext>
+            </a:extLst>
+          </p:cNvPr>
+          <p:cNvPicPr>
+            <a:picLocks noChangeAspect="1"/>
+          </p:cNvPicPr>
+          <p:nvPr/>
+        </p:nvPicPr>
+        <p:blipFill rotWithShape="1">
+          <a:blip r:embed="rId6">
+            <a:extLst>
+              <a:ext uri="{28A0092B-C50C-407E-A947-70E740481C1C}">
+                <a14:useLocalDpi xmlns:a14="http://schemas.microsoft.com/office/drawing/2010/main" val="0"/>
+              </a:ext>
+              <a:ext uri="{96DAC541-7B7A-43D3-8B79-37D633B846F1}">
+                <asvg:svgBlip xmlns:asvg="http://schemas.microsoft.com/office/drawing/2016/SVG/main" r:embed="rId7"/>
+              </a:ext>
+            </a:extLst>
+          </a:blip>
+          <a:srcRect l="34676" t="13699" r="33814" b="12877"/>
+          <a:stretch/>
+        </p:blipFill>
+        <p:spPr>
+          <a:xfrm>
+            <a:off x="7693442" y="3811852"/>
+            <a:ext cx="287389" cy="473485"/>
+          </a:xfrm>
+          <a:prstGeom prst="rect">
+            <a:avLst/>
+          </a:prstGeom>
+        </p:spPr>
+      </p:pic>
+      <p:pic>
+        <p:nvPicPr>
+          <p:cNvPr id="19" name="Graphic 18">
+            <a:extLst>
+              <a:ext uri="{FF2B5EF4-FFF2-40B4-BE49-F238E27FC236}">
+                <a16:creationId xmlns:a16="http://schemas.microsoft.com/office/drawing/2014/main" id="{F95441C8-6957-4187-9F37-7D332A4308DC}"/>
+              </a:ext>
+            </a:extLst>
+          </p:cNvPr>
+          <p:cNvPicPr>
+            <a:picLocks noChangeAspect="1"/>
+          </p:cNvPicPr>
+          <p:nvPr/>
+        </p:nvPicPr>
+        <p:blipFill rotWithShape="1">
+          <a:blip r:embed="rId6">
+            <a:extLst>
+              <a:ext uri="{28A0092B-C50C-407E-A947-70E740481C1C}">
+                <a14:useLocalDpi xmlns:a14="http://schemas.microsoft.com/office/drawing/2010/main" val="0"/>
+              </a:ext>
+              <a:ext uri="{96DAC541-7B7A-43D3-8B79-37D633B846F1}">
+                <asvg:svgBlip xmlns:asvg="http://schemas.microsoft.com/office/drawing/2016/SVG/main" r:embed="rId7"/>
+              </a:ext>
+            </a:extLst>
+          </a:blip>
+          <a:srcRect l="34676" t="13699" r="33814" b="12877"/>
+          <a:stretch/>
+        </p:blipFill>
+        <p:spPr>
+          <a:xfrm>
+            <a:off x="6890544" y="5928047"/>
+            <a:ext cx="287389" cy="473485"/>
           </a:xfrm>
           <a:prstGeom prst="rect">
             <a:avLst/>
@@ -3935,10 +4377,10 @@
       </p:pic>
       <p:grpSp>
         <p:nvGrpSpPr>
-          <p:cNvPr id="10" name="Hand">
+          <p:cNvPr id="8" name="Group 7">
             <a:extLst>
               <a:ext uri="{FF2B5EF4-FFF2-40B4-BE49-F238E27FC236}">
-                <a16:creationId xmlns:a16="http://schemas.microsoft.com/office/drawing/2014/main" id="{F166C174-D991-4A2A-880A-8ACA7085AF8B}"/>
+                <a16:creationId xmlns:a16="http://schemas.microsoft.com/office/drawing/2014/main" id="{765C17A5-2419-4C2E-BA9A-18EAFD974F91}"/>
               </a:ext>
             </a:extLst>
           </p:cNvPr>
@@ -3947,18 +4389,81 @@
         </p:nvGrpSpPr>
         <p:grpSpPr>
           <a:xfrm>
-            <a:off x="1246166" y="-838200"/>
-            <a:ext cx="9699666" cy="8534400"/>
-            <a:chOff x="1246166" y="-838200"/>
-            <a:chExt cx="9699666" cy="8534400"/>
+            <a:off x="6413499" y="2720749"/>
+            <a:ext cx="1836610" cy="6263636"/>
+            <a:chOff x="6413499" y="2720749"/>
+            <a:chExt cx="1836610" cy="6263636"/>
           </a:xfrm>
         </p:grpSpPr>
+        <p:sp>
+          <p:nvSpPr>
+            <p:cNvPr id="5" name="Rectangle 4">
+              <a:extLst>
+                <a:ext uri="{FF2B5EF4-FFF2-40B4-BE49-F238E27FC236}">
+                  <a16:creationId xmlns:a16="http://schemas.microsoft.com/office/drawing/2014/main" id="{3D04E7AA-2F55-446A-B782-A17CD6830BEF}"/>
+                </a:ext>
+              </a:extLst>
+            </p:cNvPr>
+            <p:cNvSpPr/>
+            <p:nvPr/>
+          </p:nvSpPr>
+          <p:spPr>
+            <a:xfrm>
+              <a:off x="6413499" y="2720749"/>
+              <a:ext cx="990601" cy="1327846"/>
+            </a:xfrm>
+            <a:prstGeom prst="rect">
+              <a:avLst/>
+            </a:prstGeom>
+            <a:solidFill>
+              <a:schemeClr val="bg1"/>
+            </a:solidFill>
+            <a:ln>
+              <a:noFill/>
+            </a:ln>
+            <a:effectLst>
+              <a:outerShdw blurRad="63500" sx="102000" sy="102000" algn="ctr" rotWithShape="0">
+                <a:prstClr val="black">
+                  <a:alpha val="40000"/>
+                </a:prstClr>
+              </a:outerShdw>
+            </a:effectLst>
+            <a:scene3d>
+              <a:camera prst="perspectiveHeroicExtremeRightFacing"/>
+              <a:lightRig rig="threePt" dir="t"/>
+            </a:scene3d>
+          </p:spPr>
+          <p:style>
+            <a:lnRef idx="2">
+              <a:schemeClr val="accent1">
+                <a:shade val="50000"/>
+              </a:schemeClr>
+            </a:lnRef>
+            <a:fillRef idx="1">
+              <a:schemeClr val="accent1"/>
+            </a:fillRef>
+            <a:effectRef idx="0">
+              <a:schemeClr val="accent1"/>
+            </a:effectRef>
+            <a:fontRef idx="minor">
+              <a:schemeClr val="lt1"/>
+            </a:fontRef>
+          </p:style>
+          <p:txBody>
+            <a:bodyPr rtlCol="0" anchor="ctr"/>
+            <a:lstStyle/>
+            <a:p>
+              <a:pPr algn="ctr"/>
+              <a:endParaRPr lang="pt-PT"/>
+            </a:p>
+          </p:txBody>
+        </p:sp>
         <p:pic>
           <p:nvPicPr>
-            <p:cNvPr id="9" name="Clock_Hand">
+            <p:cNvPr id="14" name="hand">
               <a:extLst>
                 <a:ext uri="{FF2B5EF4-FFF2-40B4-BE49-F238E27FC236}">
-                  <a16:creationId xmlns:a16="http://schemas.microsoft.com/office/drawing/2014/main" id="{36FE9DB2-7C75-415B-8931-11E87982B6AC}"/>
+                  <a16:creationId xmlns:a16="http://schemas.microsoft.com/office/drawing/2014/main" id="{A302E740-26C4-4E27-944E-F2A0D04A3BDE}"/>
                 </a:ext>
               </a:extLst>
             </p:cNvPr>
@@ -3967,46 +4472,7 @@
             </p:cNvPicPr>
             <p:nvPr/>
           </p:nvPicPr>
-          <p:blipFill>
-            <a:blip r:embed="rId6">
-              <a:extLst>
-                <a:ext uri="{28A0092B-C50C-407E-A947-70E740481C1C}">
-                  <a14:useLocalDpi xmlns:a14="http://schemas.microsoft.com/office/drawing/2010/main" val="0"/>
-                </a:ext>
-                <a:ext uri="{96DAC541-7B7A-43D3-8B79-37D633B846F1}">
-                  <asvg:svgBlip xmlns:asvg="http://schemas.microsoft.com/office/drawing/2016/SVG/main" r:embed="rId7"/>
-                </a:ext>
-              </a:extLst>
-            </a:blip>
-            <a:stretch>
-              <a:fillRect/>
-            </a:stretch>
-          </p:blipFill>
-          <p:spPr>
-            <a:xfrm>
-              <a:off x="1246167" y="-838200"/>
-              <a:ext cx="9699665" cy="6858000"/>
-            </a:xfrm>
-            <a:prstGeom prst="rect">
-              <a:avLst/>
-            </a:prstGeom>
-          </p:spPr>
-        </p:pic>
-        <p:pic>
-          <p:nvPicPr>
-            <p:cNvPr id="13" name="Clock_Hand">
-              <a:extLst>
-                <a:ext uri="{FF2B5EF4-FFF2-40B4-BE49-F238E27FC236}">
-                  <a16:creationId xmlns:a16="http://schemas.microsoft.com/office/drawing/2014/main" id="{494C90E8-E6D4-41C7-A284-94F9E68B4D72}"/>
-                </a:ext>
-              </a:extLst>
-            </p:cNvPr>
-            <p:cNvPicPr>
-              <a:picLocks noChangeAspect="1"/>
-            </p:cNvPicPr>
-            <p:nvPr/>
-          </p:nvPicPr>
-          <p:blipFill>
+          <p:blipFill rotWithShape="1">
             <a:blip r:embed="rId8">
               <a:extLst>
                 <a:ext uri="{28A0092B-C50C-407E-A947-70E740481C1C}">
@@ -4017,25 +4483,31 @@
                 </a:ext>
               </a:extLst>
             </a:blip>
-            <a:stretch>
-              <a:fillRect/>
-            </a:stretch>
+            <a:srcRect l="42383" t="10528" r="41187" b="8956"/>
+            <a:stretch/>
           </p:blipFill>
           <p:spPr>
-            <a:xfrm flipV="1">
-              <a:off x="1246166" y="838200"/>
-              <a:ext cx="9699665" cy="6858000"/>
+            <a:xfrm rot="20594312">
+              <a:off x="6518004" y="2871710"/>
+              <a:ext cx="1732105" cy="6112675"/>
             </a:xfrm>
             <a:prstGeom prst="rect">
               <a:avLst/>
             </a:prstGeom>
+            <a:effectLst>
+              <a:outerShdw blurRad="63500" sx="102000" sy="102000" algn="ctr" rotWithShape="0">
+                <a:prstClr val="black">
+                  <a:alpha val="40000"/>
+                </a:prstClr>
+              </a:outerShdw>
+            </a:effectLst>
           </p:spPr>
         </p:pic>
       </p:grpSp>
     </p:spTree>
     <p:extLst>
       <p:ext uri="{BB962C8B-B14F-4D97-AF65-F5344CB8AC3E}">
-        <p14:creationId xmlns:p14="http://schemas.microsoft.com/office/powerpoint/2010/main" val="2350256145"/>
+        <p14:creationId xmlns:p14="http://schemas.microsoft.com/office/powerpoint/2010/main" val="3316454694"/>
       </p:ext>
     </p:extLst>
   </p:cSld>
@@ -4078,7 +4550,7 @@
                             </p:stCondLst>
                             <p:childTnLst>
                               <p:par>
-                                <p:cTn id="5" presetID="10" presetClass="entr" presetSubtype="0" fill="hold" nodeType="withEffect">
+                                <p:cTn id="5" presetID="10" presetClass="entr" presetSubtype="0" fill="hold" nodeType="afterEffect">
                                   <p:stCondLst>
                                     <p:cond delay="0"/>
                                   </p:stCondLst>
@@ -4091,7 +4563,7 @@
                                           </p:stCondLst>
                                         </p:cTn>
                                         <p:tgtEl>
-                                          <p:spTgt spid="7"/>
+                                          <p:spTgt spid="11"/>
                                         </p:tgtEl>
                                         <p:attrNameLst>
                                           <p:attrName>style.visibility</p:attrName>
@@ -4105,7 +4577,77 @@
                                       <p:cBhvr>
                                         <p:cTn id="7" dur="500"/>
                                         <p:tgtEl>
-                                          <p:spTgt spid="7"/>
+                                          <p:spTgt spid="11"/>
+                                        </p:tgtEl>
+                                      </p:cBhvr>
+                                    </p:animEffect>
+                                  </p:childTnLst>
+                                </p:cTn>
+                              </p:par>
+                              <p:par>
+                                <p:cTn id="8" presetID="10" presetClass="entr" presetSubtype="0" fill="hold" nodeType="withEffect">
+                                  <p:stCondLst>
+                                    <p:cond delay="0"/>
+                                  </p:stCondLst>
+                                  <p:childTnLst>
+                                    <p:set>
+                                      <p:cBhvr>
+                                        <p:cTn id="9" dur="1" fill="hold">
+                                          <p:stCondLst>
+                                            <p:cond delay="0"/>
+                                          </p:stCondLst>
+                                        </p:cTn>
+                                        <p:tgtEl>
+                                          <p:spTgt spid="9"/>
+                                        </p:tgtEl>
+                                        <p:attrNameLst>
+                                          <p:attrName>style.visibility</p:attrName>
+                                        </p:attrNameLst>
+                                      </p:cBhvr>
+                                      <p:to>
+                                        <p:strVal val="visible"/>
+                                      </p:to>
+                                    </p:set>
+                                    <p:animEffect transition="in" filter="fade">
+                                      <p:cBhvr>
+                                        <p:cTn id="10" dur="500"/>
+                                        <p:tgtEl>
+                                          <p:spTgt spid="9"/>
+                                        </p:tgtEl>
+                                      </p:cBhvr>
+                                    </p:animEffect>
+                                  </p:childTnLst>
+                                </p:cTn>
+                              </p:par>
+                              <p:par>
+                                <p:cTn id="11" presetID="10" presetClass="entr" presetSubtype="0" fill="hold" grpId="0" nodeType="withEffect">
+                                  <p:stCondLst>
+                                    <p:cond delay="0"/>
+                                  </p:stCondLst>
+                                  <p:childTnLst>
+                                    <p:set>
+                                      <p:cBhvr>
+                                        <p:cTn id="12" dur="1" fill="hold">
+                                          <p:stCondLst>
+                                            <p:cond delay="0"/>
+                                          </p:stCondLst>
+                                        </p:cTn>
+                                        <p:tgtEl>
+                                          <p:spTgt spid="10"/>
+                                        </p:tgtEl>
+                                        <p:attrNameLst>
+                                          <p:attrName>style.visibility</p:attrName>
+                                        </p:attrNameLst>
+                                      </p:cBhvr>
+                                      <p:to>
+                                        <p:strVal val="visible"/>
+                                      </p:to>
+                                    </p:set>
+                                    <p:animEffect transition="in" filter="fade">
+                                      <p:cBhvr>
+                                        <p:cTn id="13" dur="500"/>
+                                        <p:tgtEl>
+                                          <p:spTgt spid="10"/>
                                         </p:tgtEl>
                                       </p:cBhvr>
                                     </p:animEffect>
@@ -4116,22 +4658,199 @@
                           </p:cTn>
                         </p:par>
                         <p:par>
-                          <p:cTn id="8" fill="hold">
+                          <p:cTn id="14" fill="hold">
                             <p:stCondLst>
                               <p:cond delay="500"/>
                             </p:stCondLst>
                             <p:childTnLst>
                               <p:par>
-                                <p:cTn id="9" presetID="8" presetClass="emph" presetSubtype="0" repeatCount="indefinite" fill="hold" nodeType="afterEffect">
+                                <p:cTn id="15" presetID="42" presetClass="path" presetSubtype="0" repeatCount="1600" accel="50000" decel="50000" autoRev="1" fill="hold" nodeType="afterEffect">
                                   <p:stCondLst>
                                     <p:cond delay="0"/>
                                   </p:stCondLst>
                                   <p:childTnLst>
-                                    <p:animRot by="21600000">
-                                      <p:cBhvr>
-                                        <p:cTn id="10" dur="20000" fill="hold"/>
-                                        <p:tgtEl>
-                                          <p:spTgt spid="7"/>
+                                    <p:animMotion origin="layout" path="M 6.25E-7 -3.7037E-6 L 0.00143 -0.02569 " pathEditMode="relative" rAng="0" ptsTypes="AA">
+                                      <p:cBhvr>
+                                        <p:cTn id="16" dur="3000" fill="hold"/>
+                                        <p:tgtEl>
+                                          <p:spTgt spid="11"/>
+                                        </p:tgtEl>
+                                        <p:attrNameLst>
+                                          <p:attrName>ppt_x</p:attrName>
+                                          <p:attrName>ppt_y</p:attrName>
+                                        </p:attrNameLst>
+                                      </p:cBhvr>
+                                      <p:rCtr x="65" y="-1296"/>
+                                    </p:animMotion>
+                                  </p:childTnLst>
+                                </p:cTn>
+                              </p:par>
+                              <p:par>
+                                <p:cTn id="17" presetID="6" presetClass="emph" presetSubtype="0" repeatCount="indefinite" autoRev="1" fill="hold" grpId="1" nodeType="withEffect">
+                                  <p:stCondLst>
+                                    <p:cond delay="0"/>
+                                  </p:stCondLst>
+                                  <p:childTnLst>
+                                    <p:animScale>
+                                      <p:cBhvr>
+                                        <p:cTn id="18" dur="3000" fill="hold"/>
+                                        <p:tgtEl>
+                                          <p:spTgt spid="10"/>
+                                        </p:tgtEl>
+                                      </p:cBhvr>
+                                      <p:by x="120000" y="120000"/>
+                                    </p:animScale>
+                                  </p:childTnLst>
+                                </p:cTn>
+                              </p:par>
+                              <p:par>
+                                <p:cTn id="19" presetID="2" presetClass="entr" presetSubtype="4" fill="hold" nodeType="withEffect">
+                                  <p:stCondLst>
+                                    <p:cond delay="0"/>
+                                  </p:stCondLst>
+                                  <p:childTnLst>
+                                    <p:set>
+                                      <p:cBhvr>
+                                        <p:cTn id="20" dur="1" fill="hold">
+                                          <p:stCondLst>
+                                            <p:cond delay="0"/>
+                                          </p:stCondLst>
+                                        </p:cTn>
+                                        <p:tgtEl>
+                                          <p:spTgt spid="8"/>
+                                        </p:tgtEl>
+                                        <p:attrNameLst>
+                                          <p:attrName>style.visibility</p:attrName>
+                                        </p:attrNameLst>
+                                      </p:cBhvr>
+                                      <p:to>
+                                        <p:strVal val="visible"/>
+                                      </p:to>
+                                    </p:set>
+                                    <p:anim calcmode="lin" valueType="num">
+                                      <p:cBhvr additive="base">
+                                        <p:cTn id="21" dur="500" fill="hold"/>
+                                        <p:tgtEl>
+                                          <p:spTgt spid="8"/>
+                                        </p:tgtEl>
+                                        <p:attrNameLst>
+                                          <p:attrName>ppt_x</p:attrName>
+                                        </p:attrNameLst>
+                                      </p:cBhvr>
+                                      <p:tavLst>
+                                        <p:tav tm="0">
+                                          <p:val>
+                                            <p:strVal val="#ppt_x"/>
+                                          </p:val>
+                                        </p:tav>
+                                        <p:tav tm="100000">
+                                          <p:val>
+                                            <p:strVal val="#ppt_x"/>
+                                          </p:val>
+                                        </p:tav>
+                                      </p:tavLst>
+                                    </p:anim>
+                                    <p:anim calcmode="lin" valueType="num">
+                                      <p:cBhvr additive="base">
+                                        <p:cTn id="22" dur="500" fill="hold"/>
+                                        <p:tgtEl>
+                                          <p:spTgt spid="8"/>
+                                        </p:tgtEl>
+                                        <p:attrNameLst>
+                                          <p:attrName>ppt_y</p:attrName>
+                                        </p:attrNameLst>
+                                      </p:cBhvr>
+                                      <p:tavLst>
+                                        <p:tav tm="0">
+                                          <p:val>
+                                            <p:strVal val="1+#ppt_h/2"/>
+                                          </p:val>
+                                        </p:tav>
+                                        <p:tav tm="100000">
+                                          <p:val>
+                                            <p:strVal val="#ppt_y"/>
+                                          </p:val>
+                                        </p:tav>
+                                      </p:tavLst>
+                                    </p:anim>
+                                  </p:childTnLst>
+                                </p:cTn>
+                              </p:par>
+                              <p:par>
+                                <p:cTn id="23" presetID="32" presetClass="emph" presetSubtype="0" repeatCount="indefinite" fill="hold" nodeType="withEffect">
+                                  <p:stCondLst>
+                                    <p:cond delay="0"/>
+                                  </p:stCondLst>
+                                  <p:childTnLst>
+                                    <p:animRot by="120000">
+                                      <p:cBhvr>
+                                        <p:cTn id="24" dur="300" fill="hold">
+                                          <p:stCondLst>
+                                            <p:cond delay="0"/>
+                                          </p:stCondLst>
+                                        </p:cTn>
+                                        <p:tgtEl>
+                                          <p:spTgt spid="8"/>
+                                        </p:tgtEl>
+                                        <p:attrNameLst>
+                                          <p:attrName>r</p:attrName>
+                                        </p:attrNameLst>
+                                      </p:cBhvr>
+                                    </p:animRot>
+                                    <p:animRot by="-240000">
+                                      <p:cBhvr>
+                                        <p:cTn id="25" dur="600" fill="hold">
+                                          <p:stCondLst>
+                                            <p:cond delay="600"/>
+                                          </p:stCondLst>
+                                        </p:cTn>
+                                        <p:tgtEl>
+                                          <p:spTgt spid="8"/>
+                                        </p:tgtEl>
+                                        <p:attrNameLst>
+                                          <p:attrName>r</p:attrName>
+                                        </p:attrNameLst>
+                                      </p:cBhvr>
+                                    </p:animRot>
+                                    <p:animRot by="240000">
+                                      <p:cBhvr>
+                                        <p:cTn id="26" dur="600" fill="hold">
+                                          <p:stCondLst>
+                                            <p:cond delay="1200"/>
+                                          </p:stCondLst>
+                                        </p:cTn>
+                                        <p:tgtEl>
+                                          <p:spTgt spid="8"/>
+                                        </p:tgtEl>
+                                        <p:attrNameLst>
+                                          <p:attrName>r</p:attrName>
+                                        </p:attrNameLst>
+                                      </p:cBhvr>
+                                    </p:animRot>
+                                    <p:animRot by="-240000">
+                                      <p:cBhvr>
+                                        <p:cTn id="27" dur="600" fill="hold">
+                                          <p:stCondLst>
+                                            <p:cond delay="1800"/>
+                                          </p:stCondLst>
+                                        </p:cTn>
+                                        <p:tgtEl>
+                                          <p:spTgt spid="8"/>
+                                        </p:tgtEl>
+                                        <p:attrNameLst>
+                                          <p:attrName>r</p:attrName>
+                                        </p:attrNameLst>
+                                      </p:cBhvr>
+                                    </p:animRot>
+                                    <p:animRot by="120000">
+                                      <p:cBhvr>
+                                        <p:cTn id="28" dur="600" fill="hold">
+                                          <p:stCondLst>
+                                            <p:cond delay="2400"/>
+                                          </p:stCondLst>
+                                        </p:cTn>
+                                        <p:tgtEl>
+                                          <p:spTgt spid="8"/>
                                         </p:tgtEl>
                                         <p:attrNameLst>
                                           <p:attrName>r</p:attrName>
@@ -4142,20 +4861,20 @@
                                 </p:cTn>
                               </p:par>
                               <p:par>
-                                <p:cTn id="11" presetID="10" presetClass="entr" presetSubtype="0" fill="hold" nodeType="withEffect">
+                                <p:cTn id="29" presetID="10" presetClass="entr" presetSubtype="0" fill="hold" nodeType="withEffect">
                                   <p:stCondLst>
                                     <p:cond delay="0"/>
                                   </p:stCondLst>
                                   <p:childTnLst>
                                     <p:set>
                                       <p:cBhvr>
-                                        <p:cTn id="12" dur="1" fill="hold">
+                                        <p:cTn id="30" dur="1" fill="hold">
                                           <p:stCondLst>
                                             <p:cond delay="0"/>
                                           </p:stCondLst>
                                         </p:cTn>
                                         <p:tgtEl>
-                                          <p:spTgt spid="5"/>
+                                          <p:spTgt spid="19"/>
                                         </p:tgtEl>
                                         <p:attrNameLst>
                                           <p:attrName>style.visibility</p:attrName>
@@ -4167,9 +4886,9 @@
                                     </p:set>
                                     <p:animEffect transition="in" filter="fade">
                                       <p:cBhvr>
-                                        <p:cTn id="13" dur="500"/>
-                                        <p:tgtEl>
-                                          <p:spTgt spid="5"/>
+                                        <p:cTn id="31" dur="500"/>
+                                        <p:tgtEl>
+                                          <p:spTgt spid="19"/>
                                         </p:tgtEl>
                                       </p:cBhvr>
                                     </p:animEffect>
@@ -4177,20 +4896,20 @@
                                 </p:cTn>
                               </p:par>
                               <p:par>
-                                <p:cTn id="14" presetID="22" presetClass="entr" presetSubtype="4" fill="hold" nodeType="withEffect">
+                                <p:cTn id="32" presetID="10" presetClass="entr" presetSubtype="0" fill="hold" nodeType="withEffect">
                                   <p:stCondLst>
-                                    <p:cond delay="500"/>
+                                    <p:cond delay="0"/>
                                   </p:stCondLst>
                                   <p:childTnLst>
                                     <p:set>
                                       <p:cBhvr>
-                                        <p:cTn id="15" dur="1" fill="hold">
+                                        <p:cTn id="33" dur="1" fill="hold">
                                           <p:stCondLst>
                                             <p:cond delay="0"/>
                                           </p:stCondLst>
                                         </p:cTn>
                                         <p:tgtEl>
-                                          <p:spTgt spid="10"/>
+                                          <p:spTgt spid="18"/>
                                         </p:tgtEl>
                                         <p:attrNameLst>
                                           <p:attrName>style.visibility</p:attrName>
@@ -4200,11 +4919,11 @@
                                         <p:strVal val="visible"/>
                                       </p:to>
                                     </p:set>
-                                    <p:animEffect transition="in" filter="wipe(down)">
-                                      <p:cBhvr>
-                                        <p:cTn id="16" dur="500"/>
-                                        <p:tgtEl>
-                                          <p:spTgt spid="10"/>
+                                    <p:animEffect transition="in" filter="fade">
+                                      <p:cBhvr>
+                                        <p:cTn id="34" dur="500"/>
+                                        <p:tgtEl>
+                                          <p:spTgt spid="18"/>
                                         </p:tgtEl>
                                       </p:cBhvr>
                                     </p:animEffect>
@@ -4212,22 +4931,580 @@
                                 </p:cTn>
                               </p:par>
                               <p:par>
-                                <p:cTn id="17" presetID="8" presetClass="emph" presetSubtype="0" repeatCount="indefinite" fill="hold" nodeType="withEffect">
+                                <p:cTn id="35" presetID="10" presetClass="entr" presetSubtype="0" fill="hold" nodeType="withEffect">
+                                  <p:stCondLst>
+                                    <p:cond delay="0"/>
+                                  </p:stCondLst>
+                                  <p:childTnLst>
+                                    <p:set>
+                                      <p:cBhvr>
+                                        <p:cTn id="36" dur="1" fill="hold">
+                                          <p:stCondLst>
+                                            <p:cond delay="0"/>
+                                          </p:stCondLst>
+                                        </p:cTn>
+                                        <p:tgtEl>
+                                          <p:spTgt spid="17"/>
+                                        </p:tgtEl>
+                                        <p:attrNameLst>
+                                          <p:attrName>style.visibility</p:attrName>
+                                        </p:attrNameLst>
+                                      </p:cBhvr>
+                                      <p:to>
+                                        <p:strVal val="visible"/>
+                                      </p:to>
+                                    </p:set>
+                                    <p:animEffect transition="in" filter="fade">
+                                      <p:cBhvr>
+                                        <p:cTn id="37" dur="500"/>
+                                        <p:tgtEl>
+                                          <p:spTgt spid="17"/>
+                                        </p:tgtEl>
+                                      </p:cBhvr>
+                                    </p:animEffect>
+                                  </p:childTnLst>
+                                </p:cTn>
+                              </p:par>
+                              <p:par>
+                                <p:cTn id="38" presetID="10" presetClass="entr" presetSubtype="0" fill="hold" nodeType="withEffect">
+                                  <p:stCondLst>
+                                    <p:cond delay="0"/>
+                                  </p:stCondLst>
+                                  <p:childTnLst>
+                                    <p:set>
+                                      <p:cBhvr>
+                                        <p:cTn id="39" dur="1" fill="hold">
+                                          <p:stCondLst>
+                                            <p:cond delay="0"/>
+                                          </p:stCondLst>
+                                        </p:cTn>
+                                        <p:tgtEl>
+                                          <p:spTgt spid="16"/>
+                                        </p:tgtEl>
+                                        <p:attrNameLst>
+                                          <p:attrName>style.visibility</p:attrName>
+                                        </p:attrNameLst>
+                                      </p:cBhvr>
+                                      <p:to>
+                                        <p:strVal val="visible"/>
+                                      </p:to>
+                                    </p:set>
+                                    <p:animEffect transition="in" filter="fade">
+                                      <p:cBhvr>
+                                        <p:cTn id="40" dur="500"/>
+                                        <p:tgtEl>
+                                          <p:spTgt spid="16"/>
+                                        </p:tgtEl>
+                                      </p:cBhvr>
+                                    </p:animEffect>
+                                  </p:childTnLst>
+                                </p:cTn>
+                              </p:par>
+                              <p:par>
+                                <p:cTn id="41" presetID="10" presetClass="entr" presetSubtype="0" fill="hold" nodeType="withEffect">
+                                  <p:stCondLst>
+                                    <p:cond delay="0"/>
+                                  </p:stCondLst>
+                                  <p:childTnLst>
+                                    <p:set>
+                                      <p:cBhvr>
+                                        <p:cTn id="42" dur="1" fill="hold">
+                                          <p:stCondLst>
+                                            <p:cond delay="0"/>
+                                          </p:stCondLst>
+                                        </p:cTn>
+                                        <p:tgtEl>
+                                          <p:spTgt spid="12"/>
+                                        </p:tgtEl>
+                                        <p:attrNameLst>
+                                          <p:attrName>style.visibility</p:attrName>
+                                        </p:attrNameLst>
+                                      </p:cBhvr>
+                                      <p:to>
+                                        <p:strVal val="visible"/>
+                                      </p:to>
+                                    </p:set>
+                                    <p:animEffect transition="in" filter="fade">
+                                      <p:cBhvr>
+                                        <p:cTn id="43" dur="500"/>
+                                        <p:tgtEl>
+                                          <p:spTgt spid="12"/>
+                                        </p:tgtEl>
+                                      </p:cBhvr>
+                                    </p:animEffect>
+                                  </p:childTnLst>
+                                </p:cTn>
+                              </p:par>
+                              <p:par>
+                                <p:cTn id="44" presetID="10" presetClass="entr" presetSubtype="0" fill="hold" nodeType="withEffect">
+                                  <p:stCondLst>
+                                    <p:cond delay="0"/>
+                                  </p:stCondLst>
+                                  <p:childTnLst>
+                                    <p:set>
+                                      <p:cBhvr>
+                                        <p:cTn id="45" dur="1" fill="hold">
+                                          <p:stCondLst>
+                                            <p:cond delay="0"/>
+                                          </p:stCondLst>
+                                        </p:cTn>
+                                        <p:tgtEl>
+                                          <p:spTgt spid="7"/>
+                                        </p:tgtEl>
+                                        <p:attrNameLst>
+                                          <p:attrName>style.visibility</p:attrName>
+                                        </p:attrNameLst>
+                                      </p:cBhvr>
+                                      <p:to>
+                                        <p:strVal val="visible"/>
+                                      </p:to>
+                                    </p:set>
+                                    <p:animEffect transition="in" filter="fade">
+                                      <p:cBhvr>
+                                        <p:cTn id="46" dur="500"/>
+                                        <p:tgtEl>
+                                          <p:spTgt spid="7"/>
+                                        </p:tgtEl>
+                                      </p:cBhvr>
+                                    </p:animEffect>
+                                  </p:childTnLst>
+                                </p:cTn>
+                              </p:par>
+                              <p:par>
+                                <p:cTn id="47" presetID="2" presetClass="exit" presetSubtype="4" repeatCount="indefinite" fill="hold" nodeType="withEffect">
+                                  <p:stCondLst>
+                                    <p:cond delay="300"/>
+                                  </p:stCondLst>
+                                  <p:childTnLst>
+                                    <p:anim calcmode="lin" valueType="num">
+                                      <p:cBhvr additive="base">
+                                        <p:cTn id="48" dur="2000"/>
+                                        <p:tgtEl>
+                                          <p:spTgt spid="19"/>
+                                        </p:tgtEl>
+                                        <p:attrNameLst>
+                                          <p:attrName>ppt_x</p:attrName>
+                                        </p:attrNameLst>
+                                      </p:cBhvr>
+                                      <p:tavLst>
+                                        <p:tav tm="0">
+                                          <p:val>
+                                            <p:strVal val="ppt_x"/>
+                                          </p:val>
+                                        </p:tav>
+                                        <p:tav tm="100000">
+                                          <p:val>
+                                            <p:strVal val="ppt_x"/>
+                                          </p:val>
+                                        </p:tav>
+                                      </p:tavLst>
+                                    </p:anim>
+                                    <p:anim calcmode="lin" valueType="num">
+                                      <p:cBhvr additive="base">
+                                        <p:cTn id="49" dur="2000"/>
+                                        <p:tgtEl>
+                                          <p:spTgt spid="19"/>
+                                        </p:tgtEl>
+                                        <p:attrNameLst>
+                                          <p:attrName>ppt_y</p:attrName>
+                                        </p:attrNameLst>
+                                      </p:cBhvr>
+                                      <p:tavLst>
+                                        <p:tav tm="0">
+                                          <p:val>
+                                            <p:strVal val="ppt_y"/>
+                                          </p:val>
+                                        </p:tav>
+                                        <p:tav tm="100000">
+                                          <p:val>
+                                            <p:strVal val="1+ppt_h/2"/>
+                                          </p:val>
+                                        </p:tav>
+                                      </p:tavLst>
+                                    </p:anim>
+                                    <p:set>
+                                      <p:cBhvr>
+                                        <p:cTn id="50" dur="1" fill="hold">
+                                          <p:stCondLst>
+                                            <p:cond delay="1999"/>
+                                          </p:stCondLst>
+                                        </p:cTn>
+                                        <p:tgtEl>
+                                          <p:spTgt spid="19"/>
+                                        </p:tgtEl>
+                                        <p:attrNameLst>
+                                          <p:attrName>style.visibility</p:attrName>
+                                        </p:attrNameLst>
+                                      </p:cBhvr>
+                                      <p:to>
+                                        <p:strVal val="hidden"/>
+                                      </p:to>
+                                    </p:set>
+                                  </p:childTnLst>
+                                </p:cTn>
+                              </p:par>
+                              <p:par>
+                                <p:cTn id="51" presetID="2" presetClass="exit" presetSubtype="4" repeatCount="indefinite" fill="hold" nodeType="withEffect">
+                                  <p:stCondLst>
+                                    <p:cond delay="0"/>
+                                  </p:stCondLst>
+                                  <p:childTnLst>
+                                    <p:anim calcmode="lin" valueType="num">
+                                      <p:cBhvr additive="base">
+                                        <p:cTn id="52" dur="2000"/>
+                                        <p:tgtEl>
+                                          <p:spTgt spid="18"/>
+                                        </p:tgtEl>
+                                        <p:attrNameLst>
+                                          <p:attrName>ppt_x</p:attrName>
+                                        </p:attrNameLst>
+                                      </p:cBhvr>
+                                      <p:tavLst>
+                                        <p:tav tm="0">
+                                          <p:val>
+                                            <p:strVal val="ppt_x"/>
+                                          </p:val>
+                                        </p:tav>
+                                        <p:tav tm="100000">
+                                          <p:val>
+                                            <p:strVal val="ppt_x"/>
+                                          </p:val>
+                                        </p:tav>
+                                      </p:tavLst>
+                                    </p:anim>
+                                    <p:anim calcmode="lin" valueType="num">
+                                      <p:cBhvr additive="base">
+                                        <p:cTn id="53" dur="2000"/>
+                                        <p:tgtEl>
+                                          <p:spTgt spid="18"/>
+                                        </p:tgtEl>
+                                        <p:attrNameLst>
+                                          <p:attrName>ppt_y</p:attrName>
+                                        </p:attrNameLst>
+                                      </p:cBhvr>
+                                      <p:tavLst>
+                                        <p:tav tm="0">
+                                          <p:val>
+                                            <p:strVal val="ppt_y"/>
+                                          </p:val>
+                                        </p:tav>
+                                        <p:tav tm="100000">
+                                          <p:val>
+                                            <p:strVal val="1+ppt_h/2"/>
+                                          </p:val>
+                                        </p:tav>
+                                      </p:tavLst>
+                                    </p:anim>
+                                    <p:set>
+                                      <p:cBhvr>
+                                        <p:cTn id="54" dur="1" fill="hold">
+                                          <p:stCondLst>
+                                            <p:cond delay="1999"/>
+                                          </p:stCondLst>
+                                        </p:cTn>
+                                        <p:tgtEl>
+                                          <p:spTgt spid="18"/>
+                                        </p:tgtEl>
+                                        <p:attrNameLst>
+                                          <p:attrName>style.visibility</p:attrName>
+                                        </p:attrNameLst>
+                                      </p:cBhvr>
+                                      <p:to>
+                                        <p:strVal val="hidden"/>
+                                      </p:to>
+                                    </p:set>
+                                  </p:childTnLst>
+                                </p:cTn>
+                              </p:par>
+                              <p:par>
+                                <p:cTn id="55" presetID="2" presetClass="exit" presetSubtype="4" repeatCount="indefinite" fill="hold" nodeType="withEffect">
                                   <p:stCondLst>
                                     <p:cond delay="1000"/>
                                   </p:stCondLst>
                                   <p:childTnLst>
-                                    <p:animRot by="21600000">
-                                      <p:cBhvr>
-                                        <p:cTn id="18" dur="5000" fill="hold"/>
-                                        <p:tgtEl>
-                                          <p:spTgt spid="10"/>
-                                        </p:tgtEl>
-                                        <p:attrNameLst>
-                                          <p:attrName>r</p:attrName>
-                                        </p:attrNameLst>
-                                      </p:cBhvr>
-                                    </p:animRot>
+                                    <p:anim calcmode="lin" valueType="num">
+                                      <p:cBhvr additive="base">
+                                        <p:cTn id="56" dur="2000"/>
+                                        <p:tgtEl>
+                                          <p:spTgt spid="17"/>
+                                        </p:tgtEl>
+                                        <p:attrNameLst>
+                                          <p:attrName>ppt_x</p:attrName>
+                                        </p:attrNameLst>
+                                      </p:cBhvr>
+                                      <p:tavLst>
+                                        <p:tav tm="0">
+                                          <p:val>
+                                            <p:strVal val="ppt_x"/>
+                                          </p:val>
+                                        </p:tav>
+                                        <p:tav tm="100000">
+                                          <p:val>
+                                            <p:strVal val="ppt_x"/>
+                                          </p:val>
+                                        </p:tav>
+                                      </p:tavLst>
+                                    </p:anim>
+                                    <p:anim calcmode="lin" valueType="num">
+                                      <p:cBhvr additive="base">
+                                        <p:cTn id="57" dur="2000"/>
+                                        <p:tgtEl>
+                                          <p:spTgt spid="17"/>
+                                        </p:tgtEl>
+                                        <p:attrNameLst>
+                                          <p:attrName>ppt_y</p:attrName>
+                                        </p:attrNameLst>
+                                      </p:cBhvr>
+                                      <p:tavLst>
+                                        <p:tav tm="0">
+                                          <p:val>
+                                            <p:strVal val="ppt_y"/>
+                                          </p:val>
+                                        </p:tav>
+                                        <p:tav tm="100000">
+                                          <p:val>
+                                            <p:strVal val="1+ppt_h/2"/>
+                                          </p:val>
+                                        </p:tav>
+                                      </p:tavLst>
+                                    </p:anim>
+                                    <p:set>
+                                      <p:cBhvr>
+                                        <p:cTn id="58" dur="1" fill="hold">
+                                          <p:stCondLst>
+                                            <p:cond delay="1999"/>
+                                          </p:stCondLst>
+                                        </p:cTn>
+                                        <p:tgtEl>
+                                          <p:spTgt spid="17"/>
+                                        </p:tgtEl>
+                                        <p:attrNameLst>
+                                          <p:attrName>style.visibility</p:attrName>
+                                        </p:attrNameLst>
+                                      </p:cBhvr>
+                                      <p:to>
+                                        <p:strVal val="hidden"/>
+                                      </p:to>
+                                    </p:set>
+                                  </p:childTnLst>
+                                </p:cTn>
+                              </p:par>
+                              <p:par>
+                                <p:cTn id="59" presetID="2" presetClass="exit" presetSubtype="4" repeatCount="indefinite" fill="hold" nodeType="withEffect">
+                                  <p:stCondLst>
+                                    <p:cond delay="400"/>
+                                  </p:stCondLst>
+                                  <p:childTnLst>
+                                    <p:anim calcmode="lin" valueType="num">
+                                      <p:cBhvr additive="base">
+                                        <p:cTn id="60" dur="2000"/>
+                                        <p:tgtEl>
+                                          <p:spTgt spid="16"/>
+                                        </p:tgtEl>
+                                        <p:attrNameLst>
+                                          <p:attrName>ppt_x</p:attrName>
+                                        </p:attrNameLst>
+                                      </p:cBhvr>
+                                      <p:tavLst>
+                                        <p:tav tm="0">
+                                          <p:val>
+                                            <p:strVal val="ppt_x"/>
+                                          </p:val>
+                                        </p:tav>
+                                        <p:tav tm="100000">
+                                          <p:val>
+                                            <p:strVal val="ppt_x"/>
+                                          </p:val>
+                                        </p:tav>
+                                      </p:tavLst>
+                                    </p:anim>
+                                    <p:anim calcmode="lin" valueType="num">
+                                      <p:cBhvr additive="base">
+                                        <p:cTn id="61" dur="2000"/>
+                                        <p:tgtEl>
+                                          <p:spTgt spid="16"/>
+                                        </p:tgtEl>
+                                        <p:attrNameLst>
+                                          <p:attrName>ppt_y</p:attrName>
+                                        </p:attrNameLst>
+                                      </p:cBhvr>
+                                      <p:tavLst>
+                                        <p:tav tm="0">
+                                          <p:val>
+                                            <p:strVal val="ppt_y"/>
+                                          </p:val>
+                                        </p:tav>
+                                        <p:tav tm="100000">
+                                          <p:val>
+                                            <p:strVal val="1+ppt_h/2"/>
+                                          </p:val>
+                                        </p:tav>
+                                      </p:tavLst>
+                                    </p:anim>
+                                    <p:set>
+                                      <p:cBhvr>
+                                        <p:cTn id="62" dur="1" fill="hold">
+                                          <p:stCondLst>
+                                            <p:cond delay="1999"/>
+                                          </p:stCondLst>
+                                        </p:cTn>
+                                        <p:tgtEl>
+                                          <p:spTgt spid="16"/>
+                                        </p:tgtEl>
+                                        <p:attrNameLst>
+                                          <p:attrName>style.visibility</p:attrName>
+                                        </p:attrNameLst>
+                                      </p:cBhvr>
+                                      <p:to>
+                                        <p:strVal val="hidden"/>
+                                      </p:to>
+                                    </p:set>
+                                  </p:childTnLst>
+                                </p:cTn>
+                              </p:par>
+                              <p:par>
+                                <p:cTn id="63" presetID="2" presetClass="exit" presetSubtype="4" repeatCount="indefinite" fill="hold" nodeType="withEffect">
+                                  <p:stCondLst>
+                                    <p:cond delay="800"/>
+                                  </p:stCondLst>
+                                  <p:childTnLst>
+                                    <p:anim calcmode="lin" valueType="num">
+                                      <p:cBhvr additive="base">
+                                        <p:cTn id="64" dur="2000"/>
+                                        <p:tgtEl>
+                                          <p:spTgt spid="12"/>
+                                        </p:tgtEl>
+                                        <p:attrNameLst>
+                                          <p:attrName>ppt_x</p:attrName>
+                                        </p:attrNameLst>
+                                      </p:cBhvr>
+                                      <p:tavLst>
+                                        <p:tav tm="0">
+                                          <p:val>
+                                            <p:strVal val="ppt_x"/>
+                                          </p:val>
+                                        </p:tav>
+                                        <p:tav tm="100000">
+                                          <p:val>
+                                            <p:strVal val="ppt_x"/>
+                                          </p:val>
+                                        </p:tav>
+                                      </p:tavLst>
+                                    </p:anim>
+                                    <p:anim calcmode="lin" valueType="num">
+                                      <p:cBhvr additive="base">
+                                        <p:cTn id="65" dur="2000"/>
+                                        <p:tgtEl>
+                                          <p:spTgt spid="12"/>
+                                        </p:tgtEl>
+                                        <p:attrNameLst>
+                                          <p:attrName>ppt_y</p:attrName>
+                                        </p:attrNameLst>
+                                      </p:cBhvr>
+                                      <p:tavLst>
+                                        <p:tav tm="0">
+                                          <p:val>
+                                            <p:strVal val="ppt_y"/>
+                                          </p:val>
+                                        </p:tav>
+                                        <p:tav tm="100000">
+                                          <p:val>
+                                            <p:strVal val="1+ppt_h/2"/>
+                                          </p:val>
+                                        </p:tav>
+                                      </p:tavLst>
+                                    </p:anim>
+                                    <p:set>
+                                      <p:cBhvr>
+                                        <p:cTn id="66" dur="1" fill="hold">
+                                          <p:stCondLst>
+                                            <p:cond delay="1999"/>
+                                          </p:stCondLst>
+                                        </p:cTn>
+                                        <p:tgtEl>
+                                          <p:spTgt spid="12"/>
+                                        </p:tgtEl>
+                                        <p:attrNameLst>
+                                          <p:attrName>style.visibility</p:attrName>
+                                        </p:attrNameLst>
+                                      </p:cBhvr>
+                                      <p:to>
+                                        <p:strVal val="hidden"/>
+                                      </p:to>
+                                    </p:set>
+                                  </p:childTnLst>
+                                </p:cTn>
+                              </p:par>
+                              <p:par>
+                                <p:cTn id="67" presetID="2" presetClass="exit" presetSubtype="4" repeatCount="indefinite" fill="hold" nodeType="withEffect">
+                                  <p:stCondLst>
+                                    <p:cond delay="200"/>
+                                  </p:stCondLst>
+                                  <p:childTnLst>
+                                    <p:anim calcmode="lin" valueType="num">
+                                      <p:cBhvr additive="base">
+                                        <p:cTn id="68" dur="2000"/>
+                                        <p:tgtEl>
+                                          <p:spTgt spid="7"/>
+                                        </p:tgtEl>
+                                        <p:attrNameLst>
+                                          <p:attrName>ppt_x</p:attrName>
+                                        </p:attrNameLst>
+                                      </p:cBhvr>
+                                      <p:tavLst>
+                                        <p:tav tm="0">
+                                          <p:val>
+                                            <p:strVal val="ppt_x"/>
+                                          </p:val>
+                                        </p:tav>
+                                        <p:tav tm="100000">
+                                          <p:val>
+                                            <p:strVal val="ppt_x"/>
+                                          </p:val>
+                                        </p:tav>
+                                      </p:tavLst>
+                                    </p:anim>
+                                    <p:anim calcmode="lin" valueType="num">
+                                      <p:cBhvr additive="base">
+                                        <p:cTn id="69" dur="2000"/>
+                                        <p:tgtEl>
+                                          <p:spTgt spid="7"/>
+                                        </p:tgtEl>
+                                        <p:attrNameLst>
+                                          <p:attrName>ppt_y</p:attrName>
+                                        </p:attrNameLst>
+                                      </p:cBhvr>
+                                      <p:tavLst>
+                                        <p:tav tm="0">
+                                          <p:val>
+                                            <p:strVal val="ppt_y"/>
+                                          </p:val>
+                                        </p:tav>
+                                        <p:tav tm="100000">
+                                          <p:val>
+                                            <p:strVal val="1+ppt_h/2"/>
+                                          </p:val>
+                                        </p:tav>
+                                      </p:tavLst>
+                                    </p:anim>
+                                    <p:set>
+                                      <p:cBhvr>
+                                        <p:cTn id="70" dur="1" fill="hold">
+                                          <p:stCondLst>
+                                            <p:cond delay="1999"/>
+                                          </p:stCondLst>
+                                        </p:cTn>
+                                        <p:tgtEl>
+                                          <p:spTgt spid="7"/>
+                                        </p:tgtEl>
+                                        <p:attrNameLst>
+                                          <p:attrName>style.visibility</p:attrName>
+                                        </p:attrNameLst>
+                                      </p:cBhvr>
+                                      <p:to>
+                                        <p:strVal val="hidden"/>
+                                      </p:to>
+                                    </p:set>
                                   </p:childTnLst>
                                 </p:cTn>
                               </p:par>
@@ -4258,11 +5535,15 @@
         </p:cTn>
       </p:par>
     </p:tnLst>
+    <p:bldLst>
+      <p:bldP spid="10" grpId="0" animBg="1"/>
+      <p:bldP spid="10" grpId="1" animBg="1"/>
+    </p:bldLst>
   </p:timing>
 </p:sld>
 </file>
 
-<file path=ppt/slides/slide10.xml><?xml version="1.0" encoding="utf-8"?>
+<file path=ppt/slides/slide11.xml><?xml version="1.0" encoding="utf-8"?>
 <p:sld xmlns:a="http://schemas.openxmlformats.org/drawingml/2006/main" xmlns:r="http://schemas.openxmlformats.org/officeDocument/2006/relationships" xmlns:p="http://schemas.openxmlformats.org/presentationml/2006/main">
   <p:cSld>
     <p:spTree>
@@ -5594,7 +6875,7 @@
 </p:sld>
 </file>
 
-<file path=ppt/slides/slide11.xml><?xml version="1.0" encoding="utf-8"?>
+<file path=ppt/slides/slide12.xml><?xml version="1.0" encoding="utf-8"?>
 <p:sld xmlns:a="http://schemas.openxmlformats.org/drawingml/2006/main" xmlns:r="http://schemas.openxmlformats.org/officeDocument/2006/relationships" xmlns:p="http://schemas.openxmlformats.org/presentationml/2006/main">
   <p:cSld>
     <p:spTree>
@@ -6121,7 +7402,7 @@
 </p:sld>
 </file>
 
-<file path=ppt/slides/slide12.xml><?xml version="1.0" encoding="utf-8"?>
+<file path=ppt/slides/slide13.xml><?xml version="1.0" encoding="utf-8"?>
 <p:sld xmlns:a="http://schemas.openxmlformats.org/drawingml/2006/main" xmlns:r="http://schemas.openxmlformats.org/officeDocument/2006/relationships" xmlns:p="http://schemas.openxmlformats.org/presentationml/2006/main">
   <p:cSld>
     <p:spTree>
@@ -7409,7 +8690,7 @@
 </p:sld>
 </file>
 
-<file path=ppt/slides/slide13.xml><?xml version="1.0" encoding="utf-8"?>
+<file path=ppt/slides/slide14.xml><?xml version="1.0" encoding="utf-8"?>
 <p:sld xmlns:a="http://schemas.openxmlformats.org/drawingml/2006/main" xmlns:r="http://schemas.openxmlformats.org/officeDocument/2006/relationships" xmlns:p="http://schemas.openxmlformats.org/presentationml/2006/main">
   <p:cSld>
     <p:spTree>
@@ -7970,7 +9251,472 @@
 </p:sld>
 </file>
 
+<file path=ppt/slides/slide15.xml><?xml version="1.0" encoding="utf-8"?>
+<p:sld xmlns:a="http://schemas.openxmlformats.org/drawingml/2006/main" xmlns:r="http://schemas.openxmlformats.org/officeDocument/2006/relationships" xmlns:p="http://schemas.openxmlformats.org/presentationml/2006/main">
+  <p:cSld>
+    <p:spTree>
+      <p:nvGrpSpPr>
+        <p:cNvPr id="1" name=""/>
+        <p:cNvGrpSpPr/>
+        <p:nvPr/>
+      </p:nvGrpSpPr>
+      <p:grpSpPr>
+        <a:xfrm>
+          <a:off x="0" y="0"/>
+          <a:ext cx="0" cy="0"/>
+          <a:chOff x="0" y="0"/>
+          <a:chExt cx="0" cy="0"/>
+        </a:xfrm>
+      </p:grpSpPr>
+    </p:spTree>
+    <p:extLst>
+      <p:ext uri="{BB962C8B-B14F-4D97-AF65-F5344CB8AC3E}">
+        <p14:creationId xmlns:p14="http://schemas.microsoft.com/office/powerpoint/2010/main" val="120903474"/>
+      </p:ext>
+    </p:extLst>
+  </p:cSld>
+  <p:clrMapOvr>
+    <a:masterClrMapping/>
+  </p:clrMapOvr>
+  <mc:AlternateContent xmlns:mc="http://schemas.openxmlformats.org/markup-compatibility/2006">
+    <mc:Choice xmlns:p15="http://schemas.microsoft.com/office/powerpoint/2012/main" Requires="p15">
+      <p:transition xmlns:p14="http://schemas.microsoft.com/office/powerpoint/2010/main" spd="slow" p14:dur="1250">
+        <p15:prstTrans prst="peelOff"/>
+      </p:transition>
+    </mc:Choice>
+    <mc:Fallback>
+      <p:transition spd="slow">
+        <p:fade/>
+      </p:transition>
+    </mc:Fallback>
+  </mc:AlternateContent>
+</p:sld>
+</file>
+
 <file path=ppt/slides/slide2.xml><?xml version="1.0" encoding="utf-8"?>
+<p:sld xmlns:a="http://schemas.openxmlformats.org/drawingml/2006/main" xmlns:r="http://schemas.openxmlformats.org/officeDocument/2006/relationships" xmlns:p="http://schemas.openxmlformats.org/presentationml/2006/main">
+  <p:cSld>
+    <p:spTree>
+      <p:nvGrpSpPr>
+        <p:cNvPr id="1" name=""/>
+        <p:cNvGrpSpPr/>
+        <p:nvPr/>
+      </p:nvGrpSpPr>
+      <p:grpSpPr>
+        <a:xfrm>
+          <a:off x="0" y="0"/>
+          <a:ext cx="0" cy="0"/>
+          <a:chOff x="0" y="0"/>
+          <a:chExt cx="0" cy="0"/>
+        </a:xfrm>
+      </p:grpSpPr>
+      <p:pic>
+        <p:nvPicPr>
+          <p:cNvPr id="7" name="Spiral">
+            <a:extLst>
+              <a:ext uri="{FF2B5EF4-FFF2-40B4-BE49-F238E27FC236}">
+                <a16:creationId xmlns:a16="http://schemas.microsoft.com/office/drawing/2014/main" id="{C4178F1A-925E-480C-8DAF-A3F940931ACA}"/>
+              </a:ext>
+            </a:extLst>
+          </p:cNvPr>
+          <p:cNvPicPr>
+            <a:picLocks noChangeAspect="1"/>
+          </p:cNvPicPr>
+          <p:nvPr/>
+        </p:nvPicPr>
+        <p:blipFill rotWithShape="1">
+          <a:blip r:embed="rId2">
+            <a:extLst>
+              <a:ext uri="{28A0092B-C50C-407E-A947-70E740481C1C}">
+                <a14:useLocalDpi xmlns:a14="http://schemas.microsoft.com/office/drawing/2010/main" val="0"/>
+              </a:ext>
+              <a:ext uri="{96DAC541-7B7A-43D3-8B79-37D633B846F1}">
+                <asvg:svgBlip xmlns:asvg="http://schemas.microsoft.com/office/drawing/2016/SVG/main" r:embed="rId3"/>
+              </a:ext>
+            </a:extLst>
+          </a:blip>
+          <a:srcRect l="32493" t="24550" r="30996" b="25503"/>
+          <a:stretch/>
+        </p:blipFill>
+        <p:spPr>
+          <a:xfrm>
+            <a:off x="-1455174" y="-3874593"/>
+            <a:ext cx="15102347" cy="14607186"/>
+          </a:xfrm>
+          <a:prstGeom prst="rect">
+            <a:avLst/>
+          </a:prstGeom>
+        </p:spPr>
+      </p:pic>
+      <p:pic>
+        <p:nvPicPr>
+          <p:cNvPr id="5" name="Clock">
+            <a:extLst>
+              <a:ext uri="{FF2B5EF4-FFF2-40B4-BE49-F238E27FC236}">
+                <a16:creationId xmlns:a16="http://schemas.microsoft.com/office/drawing/2014/main" id="{0CFEE4A3-D9EB-497D-87D4-0BB775172CC4}"/>
+              </a:ext>
+            </a:extLst>
+          </p:cNvPr>
+          <p:cNvPicPr>
+            <a:picLocks noChangeAspect="1"/>
+          </p:cNvPicPr>
+          <p:nvPr/>
+        </p:nvPicPr>
+        <p:blipFill>
+          <a:blip r:embed="rId4">
+            <a:extLst>
+              <a:ext uri="{28A0092B-C50C-407E-A947-70E740481C1C}">
+                <a14:useLocalDpi xmlns:a14="http://schemas.microsoft.com/office/drawing/2010/main" val="0"/>
+              </a:ext>
+              <a:ext uri="{96DAC541-7B7A-43D3-8B79-37D633B846F1}">
+                <asvg:svgBlip xmlns:asvg="http://schemas.microsoft.com/office/drawing/2016/SVG/main" r:embed="rId5"/>
+              </a:ext>
+            </a:extLst>
+          </a:blip>
+          <a:stretch>
+            <a:fillRect/>
+          </a:stretch>
+        </p:blipFill>
+        <p:spPr>
+          <a:xfrm>
+            <a:off x="1246168" y="0"/>
+            <a:ext cx="9699665" cy="6858000"/>
+          </a:xfrm>
+          <a:prstGeom prst="rect">
+            <a:avLst/>
+          </a:prstGeom>
+        </p:spPr>
+      </p:pic>
+      <p:grpSp>
+        <p:nvGrpSpPr>
+          <p:cNvPr id="10" name="Hand">
+            <a:extLst>
+              <a:ext uri="{FF2B5EF4-FFF2-40B4-BE49-F238E27FC236}">
+                <a16:creationId xmlns:a16="http://schemas.microsoft.com/office/drawing/2014/main" id="{F166C174-D991-4A2A-880A-8ACA7085AF8B}"/>
+              </a:ext>
+            </a:extLst>
+          </p:cNvPr>
+          <p:cNvGrpSpPr/>
+          <p:nvPr/>
+        </p:nvGrpSpPr>
+        <p:grpSpPr>
+          <a:xfrm>
+            <a:off x="1246166" y="-838200"/>
+            <a:ext cx="9699666" cy="8534400"/>
+            <a:chOff x="1246166" y="-838200"/>
+            <a:chExt cx="9699666" cy="8534400"/>
+          </a:xfrm>
+        </p:grpSpPr>
+        <p:pic>
+          <p:nvPicPr>
+            <p:cNvPr id="9" name="Clock_Hand">
+              <a:extLst>
+                <a:ext uri="{FF2B5EF4-FFF2-40B4-BE49-F238E27FC236}">
+                  <a16:creationId xmlns:a16="http://schemas.microsoft.com/office/drawing/2014/main" id="{36FE9DB2-7C75-415B-8931-11E87982B6AC}"/>
+                </a:ext>
+              </a:extLst>
+            </p:cNvPr>
+            <p:cNvPicPr>
+              <a:picLocks noChangeAspect="1"/>
+            </p:cNvPicPr>
+            <p:nvPr/>
+          </p:nvPicPr>
+          <p:blipFill>
+            <a:blip r:embed="rId6">
+              <a:extLst>
+                <a:ext uri="{28A0092B-C50C-407E-A947-70E740481C1C}">
+                  <a14:useLocalDpi xmlns:a14="http://schemas.microsoft.com/office/drawing/2010/main" val="0"/>
+                </a:ext>
+                <a:ext uri="{96DAC541-7B7A-43D3-8B79-37D633B846F1}">
+                  <asvg:svgBlip xmlns:asvg="http://schemas.microsoft.com/office/drawing/2016/SVG/main" r:embed="rId7"/>
+                </a:ext>
+              </a:extLst>
+            </a:blip>
+            <a:stretch>
+              <a:fillRect/>
+            </a:stretch>
+          </p:blipFill>
+          <p:spPr>
+            <a:xfrm>
+              <a:off x="1246167" y="-838200"/>
+              <a:ext cx="9699665" cy="6858000"/>
+            </a:xfrm>
+            <a:prstGeom prst="rect">
+              <a:avLst/>
+            </a:prstGeom>
+          </p:spPr>
+        </p:pic>
+        <p:pic>
+          <p:nvPicPr>
+            <p:cNvPr id="13" name="Clock_Hand">
+              <a:extLst>
+                <a:ext uri="{FF2B5EF4-FFF2-40B4-BE49-F238E27FC236}">
+                  <a16:creationId xmlns:a16="http://schemas.microsoft.com/office/drawing/2014/main" id="{494C90E8-E6D4-41C7-A284-94F9E68B4D72}"/>
+                </a:ext>
+              </a:extLst>
+            </p:cNvPr>
+            <p:cNvPicPr>
+              <a:picLocks noChangeAspect="1"/>
+            </p:cNvPicPr>
+            <p:nvPr/>
+          </p:nvPicPr>
+          <p:blipFill>
+            <a:blip r:embed="rId8">
+              <a:extLst>
+                <a:ext uri="{28A0092B-C50C-407E-A947-70E740481C1C}">
+                  <a14:useLocalDpi xmlns:a14="http://schemas.microsoft.com/office/drawing/2010/main" val="0"/>
+                </a:ext>
+                <a:ext uri="{96DAC541-7B7A-43D3-8B79-37D633B846F1}">
+                  <asvg:svgBlip xmlns:asvg="http://schemas.microsoft.com/office/drawing/2016/SVG/main" r:embed="rId9"/>
+                </a:ext>
+              </a:extLst>
+            </a:blip>
+            <a:stretch>
+              <a:fillRect/>
+            </a:stretch>
+          </p:blipFill>
+          <p:spPr>
+            <a:xfrm flipV="1">
+              <a:off x="1246166" y="838200"/>
+              <a:ext cx="9699665" cy="6858000"/>
+            </a:xfrm>
+            <a:prstGeom prst="rect">
+              <a:avLst/>
+            </a:prstGeom>
+          </p:spPr>
+        </p:pic>
+      </p:grpSp>
+    </p:spTree>
+    <p:extLst>
+      <p:ext uri="{BB962C8B-B14F-4D97-AF65-F5344CB8AC3E}">
+        <p14:creationId xmlns:p14="http://schemas.microsoft.com/office/powerpoint/2010/main" val="2350256145"/>
+      </p:ext>
+    </p:extLst>
+  </p:cSld>
+  <p:clrMapOvr>
+    <a:masterClrMapping/>
+  </p:clrMapOvr>
+  <mc:AlternateContent xmlns:mc="http://schemas.openxmlformats.org/markup-compatibility/2006" xmlns:p15="http://schemas.microsoft.com/office/powerpoint/2012/main">
+    <mc:Choice Requires="p15">
+      <p:transition xmlns:p14="http://schemas.microsoft.com/office/powerpoint/2010/main" spd="slow" p14:dur="1250">
+        <p15:prstTrans prst="peelOff"/>
+      </p:transition>
+    </mc:Choice>
+    <mc:Fallback xmlns="">
+      <p:transition spd="slow">
+        <p:fade/>
+      </p:transition>
+    </mc:Fallback>
+  </mc:AlternateContent>
+  <p:timing>
+    <p:tnLst>
+      <p:par>
+        <p:cTn id="1" dur="indefinite" restart="never" nodeType="tmRoot">
+          <p:childTnLst>
+            <p:seq concurrent="1" nextAc="seek">
+              <p:cTn id="2" dur="indefinite" nodeType="mainSeq">
+                <p:childTnLst>
+                  <p:par>
+                    <p:cTn id="3" fill="hold">
+                      <p:stCondLst>
+                        <p:cond delay="indefinite"/>
+                        <p:cond evt="onBegin" delay="0">
+                          <p:tn val="2"/>
+                        </p:cond>
+                      </p:stCondLst>
+                      <p:childTnLst>
+                        <p:par>
+                          <p:cTn id="4" fill="hold">
+                            <p:stCondLst>
+                              <p:cond delay="0"/>
+                            </p:stCondLst>
+                            <p:childTnLst>
+                              <p:par>
+                                <p:cTn id="5" presetID="10" presetClass="entr" presetSubtype="0" fill="hold" nodeType="withEffect">
+                                  <p:stCondLst>
+                                    <p:cond delay="0"/>
+                                  </p:stCondLst>
+                                  <p:childTnLst>
+                                    <p:set>
+                                      <p:cBhvr>
+                                        <p:cTn id="6" dur="1" fill="hold">
+                                          <p:stCondLst>
+                                            <p:cond delay="0"/>
+                                          </p:stCondLst>
+                                        </p:cTn>
+                                        <p:tgtEl>
+                                          <p:spTgt spid="7"/>
+                                        </p:tgtEl>
+                                        <p:attrNameLst>
+                                          <p:attrName>style.visibility</p:attrName>
+                                        </p:attrNameLst>
+                                      </p:cBhvr>
+                                      <p:to>
+                                        <p:strVal val="visible"/>
+                                      </p:to>
+                                    </p:set>
+                                    <p:animEffect transition="in" filter="fade">
+                                      <p:cBhvr>
+                                        <p:cTn id="7" dur="500"/>
+                                        <p:tgtEl>
+                                          <p:spTgt spid="7"/>
+                                        </p:tgtEl>
+                                      </p:cBhvr>
+                                    </p:animEffect>
+                                  </p:childTnLst>
+                                </p:cTn>
+                              </p:par>
+                            </p:childTnLst>
+                          </p:cTn>
+                        </p:par>
+                        <p:par>
+                          <p:cTn id="8" fill="hold">
+                            <p:stCondLst>
+                              <p:cond delay="500"/>
+                            </p:stCondLst>
+                            <p:childTnLst>
+                              <p:par>
+                                <p:cTn id="9" presetID="8" presetClass="emph" presetSubtype="0" repeatCount="indefinite" fill="hold" nodeType="afterEffect">
+                                  <p:stCondLst>
+                                    <p:cond delay="0"/>
+                                  </p:stCondLst>
+                                  <p:childTnLst>
+                                    <p:animRot by="21600000">
+                                      <p:cBhvr>
+                                        <p:cTn id="10" dur="20000" fill="hold"/>
+                                        <p:tgtEl>
+                                          <p:spTgt spid="7"/>
+                                        </p:tgtEl>
+                                        <p:attrNameLst>
+                                          <p:attrName>r</p:attrName>
+                                        </p:attrNameLst>
+                                      </p:cBhvr>
+                                    </p:animRot>
+                                  </p:childTnLst>
+                                </p:cTn>
+                              </p:par>
+                              <p:par>
+                                <p:cTn id="11" presetID="10" presetClass="entr" presetSubtype="0" fill="hold" nodeType="withEffect">
+                                  <p:stCondLst>
+                                    <p:cond delay="0"/>
+                                  </p:stCondLst>
+                                  <p:childTnLst>
+                                    <p:set>
+                                      <p:cBhvr>
+                                        <p:cTn id="12" dur="1" fill="hold">
+                                          <p:stCondLst>
+                                            <p:cond delay="0"/>
+                                          </p:stCondLst>
+                                        </p:cTn>
+                                        <p:tgtEl>
+                                          <p:spTgt spid="5"/>
+                                        </p:tgtEl>
+                                        <p:attrNameLst>
+                                          <p:attrName>style.visibility</p:attrName>
+                                        </p:attrNameLst>
+                                      </p:cBhvr>
+                                      <p:to>
+                                        <p:strVal val="visible"/>
+                                      </p:to>
+                                    </p:set>
+                                    <p:animEffect transition="in" filter="fade">
+                                      <p:cBhvr>
+                                        <p:cTn id="13" dur="500"/>
+                                        <p:tgtEl>
+                                          <p:spTgt spid="5"/>
+                                        </p:tgtEl>
+                                      </p:cBhvr>
+                                    </p:animEffect>
+                                  </p:childTnLst>
+                                </p:cTn>
+                              </p:par>
+                              <p:par>
+                                <p:cTn id="14" presetID="22" presetClass="entr" presetSubtype="4" fill="hold" nodeType="withEffect">
+                                  <p:stCondLst>
+                                    <p:cond delay="500"/>
+                                  </p:stCondLst>
+                                  <p:childTnLst>
+                                    <p:set>
+                                      <p:cBhvr>
+                                        <p:cTn id="15" dur="1" fill="hold">
+                                          <p:stCondLst>
+                                            <p:cond delay="0"/>
+                                          </p:stCondLst>
+                                        </p:cTn>
+                                        <p:tgtEl>
+                                          <p:spTgt spid="10"/>
+                                        </p:tgtEl>
+                                        <p:attrNameLst>
+                                          <p:attrName>style.visibility</p:attrName>
+                                        </p:attrNameLst>
+                                      </p:cBhvr>
+                                      <p:to>
+                                        <p:strVal val="visible"/>
+                                      </p:to>
+                                    </p:set>
+                                    <p:animEffect transition="in" filter="wipe(down)">
+                                      <p:cBhvr>
+                                        <p:cTn id="16" dur="500"/>
+                                        <p:tgtEl>
+                                          <p:spTgt spid="10"/>
+                                        </p:tgtEl>
+                                      </p:cBhvr>
+                                    </p:animEffect>
+                                  </p:childTnLst>
+                                </p:cTn>
+                              </p:par>
+                              <p:par>
+                                <p:cTn id="17" presetID="8" presetClass="emph" presetSubtype="0" repeatCount="indefinite" fill="hold" nodeType="withEffect">
+                                  <p:stCondLst>
+                                    <p:cond delay="1000"/>
+                                  </p:stCondLst>
+                                  <p:childTnLst>
+                                    <p:animRot by="21600000">
+                                      <p:cBhvr>
+                                        <p:cTn id="18" dur="5000" fill="hold"/>
+                                        <p:tgtEl>
+                                          <p:spTgt spid="10"/>
+                                        </p:tgtEl>
+                                        <p:attrNameLst>
+                                          <p:attrName>r</p:attrName>
+                                        </p:attrNameLst>
+                                      </p:cBhvr>
+                                    </p:animRot>
+                                  </p:childTnLst>
+                                </p:cTn>
+                              </p:par>
+                            </p:childTnLst>
+                          </p:cTn>
+                        </p:par>
+                      </p:childTnLst>
+                    </p:cTn>
+                  </p:par>
+                </p:childTnLst>
+              </p:cTn>
+              <p:prevCondLst>
+                <p:cond evt="onPrev" delay="0">
+                  <p:tgtEl>
+                    <p:sldTgt/>
+                  </p:tgtEl>
+                </p:cond>
+              </p:prevCondLst>
+              <p:nextCondLst>
+                <p:cond evt="onNext" delay="0">
+                  <p:tgtEl>
+                    <p:sldTgt/>
+                  </p:tgtEl>
+                </p:cond>
+              </p:nextCondLst>
+            </p:seq>
+          </p:childTnLst>
+        </p:cTn>
+      </p:par>
+    </p:tnLst>
+  </p:timing>
+</p:sld>
+</file>
+
+<file path=ppt/slides/slide3.xml><?xml version="1.0" encoding="utf-8"?>
 <p:sld xmlns:a="http://schemas.openxmlformats.org/drawingml/2006/main" xmlns:r="http://schemas.openxmlformats.org/officeDocument/2006/relationships" xmlns:p="http://schemas.openxmlformats.org/presentationml/2006/main">
   <p:cSld>
     <p:spTree>
@@ -8531,7 +10277,7 @@
 </p:sld>
 </file>
 
-<file path=ppt/slides/slide3.xml><?xml version="1.0" encoding="utf-8"?>
+<file path=ppt/slides/slide4.xml><?xml version="1.0" encoding="utf-8"?>
 <p:sld xmlns:a="http://schemas.openxmlformats.org/drawingml/2006/main" xmlns:r="http://schemas.openxmlformats.org/officeDocument/2006/relationships" xmlns:p="http://schemas.openxmlformats.org/presentationml/2006/main">
   <p:cSld>
     <p:spTree>
@@ -8716,14 +10462,14 @@
                             </p:stCondLst>
                             <p:childTnLst>
                               <p:par>
-                                <p:cTn id="9" presetID="6" presetClass="emph" presetSubtype="0" autoRev="1" fill="hold" nodeType="afterEffect">
+                                <p:cTn id="9" presetID="6" presetClass="emph" presetSubtype="0" repeatCount="indefinite" autoRev="1" fill="hold" nodeType="afterEffect">
                                   <p:stCondLst>
                                     <p:cond delay="0"/>
                                   </p:stCondLst>
                                   <p:childTnLst>
                                     <p:animScale>
                                       <p:cBhvr>
-                                        <p:cTn id="10" dur="20000" fill="hold"/>
+                                        <p:cTn id="10" dur="5000" fill="hold"/>
                                         <p:tgtEl>
                                           <p:spTgt spid="18"/>
                                         </p:tgtEl>
@@ -8764,7 +10510,7 @@
 </p:sld>
 </file>
 
-<file path=ppt/slides/slide4.xml><?xml version="1.0" encoding="utf-8"?>
+<file path=ppt/slides/slide5.xml><?xml version="1.0" encoding="utf-8"?>
 <p:sld xmlns:a="http://schemas.openxmlformats.org/drawingml/2006/main" xmlns:r="http://schemas.openxmlformats.org/officeDocument/2006/relationships" xmlns:p="http://schemas.openxmlformats.org/presentationml/2006/main">
   <p:cSld>
     <p:spTree>
@@ -9543,7 +11289,7 @@
 </p:sld>
 </file>
 
-<file path=ppt/slides/slide5.xml><?xml version="1.0" encoding="utf-8"?>
+<file path=ppt/slides/slide6.xml><?xml version="1.0" encoding="utf-8"?>
 <p:sld xmlns:a="http://schemas.openxmlformats.org/drawingml/2006/main" xmlns:r="http://schemas.openxmlformats.org/officeDocument/2006/relationships" xmlns:p="http://schemas.openxmlformats.org/presentationml/2006/main">
   <p:cSld>
     <p:spTree>
@@ -10806,7 +12552,7 @@
 </p:sld>
 </file>
 
-<file path=ppt/slides/slide6.xml><?xml version="1.0" encoding="utf-8"?>
+<file path=ppt/slides/slide7.xml><?xml version="1.0" encoding="utf-8"?>
 <p:sld xmlns:a="http://schemas.openxmlformats.org/drawingml/2006/main" xmlns:r="http://schemas.openxmlformats.org/officeDocument/2006/relationships" xmlns:p="http://schemas.openxmlformats.org/presentationml/2006/main">
   <p:cSld>
     <p:spTree>
@@ -11730,7 +13476,7 @@
 </p:sld>
 </file>
 
-<file path=ppt/slides/slide7.xml><?xml version="1.0" encoding="utf-8"?>
+<file path=ppt/slides/slide8.xml><?xml version="1.0" encoding="utf-8"?>
 <p:sld xmlns:a="http://schemas.openxmlformats.org/drawingml/2006/main" xmlns:r="http://schemas.openxmlformats.org/officeDocument/2006/relationships" xmlns:p="http://schemas.openxmlformats.org/presentationml/2006/main">
   <p:cSld>
     <p:spTree>
@@ -12741,7 +14487,7 @@
 </p:sld>
 </file>
 
-<file path=ppt/slides/slide8.xml><?xml version="1.0" encoding="utf-8"?>
+<file path=ppt/slides/slide9.xml><?xml version="1.0" encoding="utf-8"?>
 <p:sld xmlns:a="http://schemas.openxmlformats.org/drawingml/2006/main" xmlns:r="http://schemas.openxmlformats.org/officeDocument/2006/relationships" xmlns:p="http://schemas.openxmlformats.org/presentationml/2006/main">
   <p:cSld>
     <p:spTree>
@@ -13651,1666 +15397,6 @@
       <p:bldP spid="7" grpId="0" animBg="1"/>
       <p:bldP spid="8" grpId="0" animBg="1"/>
       <p:bldP spid="9" grpId="0" animBg="1"/>
-    </p:bldLst>
-  </p:timing>
-</p:sld>
-</file>
-
-<file path=ppt/slides/slide9.xml><?xml version="1.0" encoding="utf-8"?>
-<p:sld xmlns:a="http://schemas.openxmlformats.org/drawingml/2006/main" xmlns:r="http://schemas.openxmlformats.org/officeDocument/2006/relationships" xmlns:p="http://schemas.openxmlformats.org/presentationml/2006/main">
-  <p:cSld>
-    <p:spTree>
-      <p:nvGrpSpPr>
-        <p:cNvPr id="1" name=""/>
-        <p:cNvGrpSpPr/>
-        <p:nvPr/>
-      </p:nvGrpSpPr>
-      <p:grpSpPr>
-        <a:xfrm>
-          <a:off x="0" y="0"/>
-          <a:ext cx="0" cy="0"/>
-          <a:chOff x="0" y="0"/>
-          <a:chExt cx="0" cy="0"/>
-        </a:xfrm>
-      </p:grpSpPr>
-      <p:sp>
-        <p:nvSpPr>
-          <p:cNvPr id="4" name="Background">
-            <a:extLst>
-              <a:ext uri="{FF2B5EF4-FFF2-40B4-BE49-F238E27FC236}">
-                <a16:creationId xmlns:a16="http://schemas.microsoft.com/office/drawing/2014/main" id="{58EE32A2-4065-49BB-8274-A9F2040B80A3}"/>
-              </a:ext>
-            </a:extLst>
-          </p:cNvPr>
-          <p:cNvSpPr/>
-          <p:nvPr/>
-        </p:nvSpPr>
-        <p:spPr>
-          <a:xfrm>
-            <a:off x="0" y="0"/>
-            <a:ext cx="12192000" cy="6858000"/>
-          </a:xfrm>
-          <a:prstGeom prst="rect">
-            <a:avLst/>
-          </a:prstGeom>
-          <a:solidFill>
-            <a:srgbClr val="49BB90"/>
-          </a:solidFill>
-          <a:ln>
-            <a:noFill/>
-          </a:ln>
-        </p:spPr>
-        <p:style>
-          <a:lnRef idx="2">
-            <a:schemeClr val="accent1">
-              <a:shade val="50000"/>
-            </a:schemeClr>
-          </a:lnRef>
-          <a:fillRef idx="1">
-            <a:schemeClr val="accent1"/>
-          </a:fillRef>
-          <a:effectRef idx="0">
-            <a:schemeClr val="accent1"/>
-          </a:effectRef>
-          <a:fontRef idx="minor">
-            <a:schemeClr val="lt1"/>
-          </a:fontRef>
-        </p:style>
-        <p:txBody>
-          <a:bodyPr rtlCol="0" anchor="ctr"/>
-          <a:lstStyle/>
-          <a:p>
-            <a:pPr algn="ctr"/>
-            <a:endParaRPr lang="pt-PT"/>
-          </a:p>
-        </p:txBody>
-      </p:sp>
-      <p:pic>
-        <p:nvPicPr>
-          <p:cNvPr id="9" name="Face">
-            <a:extLst>
-              <a:ext uri="{FF2B5EF4-FFF2-40B4-BE49-F238E27FC236}">
-                <a16:creationId xmlns:a16="http://schemas.microsoft.com/office/drawing/2014/main" id="{A147DBF8-885F-41F1-85A4-D3FE881FD47A}"/>
-              </a:ext>
-            </a:extLst>
-          </p:cNvPr>
-          <p:cNvPicPr>
-            <a:picLocks noChangeAspect="1"/>
-          </p:cNvPicPr>
-          <p:nvPr/>
-        </p:nvPicPr>
-        <p:blipFill>
-          <a:blip r:embed="rId2">
-            <a:extLst>
-              <a:ext uri="{28A0092B-C50C-407E-A947-70E740481C1C}">
-                <a14:useLocalDpi xmlns:a14="http://schemas.microsoft.com/office/drawing/2010/main" val="0"/>
-              </a:ext>
-              <a:ext uri="{96DAC541-7B7A-43D3-8B79-37D633B846F1}">
-                <asvg:svgBlip xmlns:asvg="http://schemas.microsoft.com/office/drawing/2016/SVG/main" r:embed="rId3"/>
-              </a:ext>
-            </a:extLst>
-          </a:blip>
-          <a:stretch>
-            <a:fillRect/>
-          </a:stretch>
-        </p:blipFill>
-        <p:spPr>
-          <a:xfrm flipH="1">
-            <a:off x="1718642" y="0"/>
-            <a:ext cx="8185166" cy="8185166"/>
-          </a:xfrm>
-          <a:prstGeom prst="rect">
-            <a:avLst/>
-          </a:prstGeom>
-          <a:effectLst>
-            <a:outerShdw blurRad="63500" sx="102000" sy="102000" algn="ctr" rotWithShape="0">
-              <a:prstClr val="black">
-                <a:alpha val="40000"/>
-              </a:prstClr>
-            </a:outerShdw>
-          </a:effectLst>
-        </p:spPr>
-      </p:pic>
-      <p:sp>
-        <p:nvSpPr>
-          <p:cNvPr id="10" name="Mouth">
-            <a:extLst>
-              <a:ext uri="{FF2B5EF4-FFF2-40B4-BE49-F238E27FC236}">
-                <a16:creationId xmlns:a16="http://schemas.microsoft.com/office/drawing/2014/main" id="{479A10FF-AB80-428F-9DCA-4A99B62F2B50}"/>
-              </a:ext>
-            </a:extLst>
-          </p:cNvPr>
-          <p:cNvSpPr/>
-          <p:nvPr/>
-        </p:nvSpPr>
-        <p:spPr>
-          <a:xfrm>
-            <a:off x="5273702" y="5116437"/>
-            <a:ext cx="265963" cy="260170"/>
-          </a:xfrm>
-          <a:prstGeom prst="ellipse">
-            <a:avLst/>
-          </a:prstGeom>
-          <a:solidFill>
-            <a:srgbClr val="14110D"/>
-          </a:solidFill>
-          <a:ln>
-            <a:noFill/>
-          </a:ln>
-        </p:spPr>
-        <p:style>
-          <a:lnRef idx="2">
-            <a:schemeClr val="accent1">
-              <a:shade val="50000"/>
-            </a:schemeClr>
-          </a:lnRef>
-          <a:fillRef idx="1">
-            <a:schemeClr val="accent1"/>
-          </a:fillRef>
-          <a:effectRef idx="0">
-            <a:schemeClr val="accent1"/>
-          </a:effectRef>
-          <a:fontRef idx="minor">
-            <a:schemeClr val="lt1"/>
-          </a:fontRef>
-        </p:style>
-        <p:txBody>
-          <a:bodyPr rtlCol="0" anchor="ctr"/>
-          <a:lstStyle/>
-          <a:p>
-            <a:pPr algn="ctr"/>
-            <a:endParaRPr lang="pt-PT" dirty="0"/>
-          </a:p>
-        </p:txBody>
-      </p:sp>
-      <p:grpSp>
-        <p:nvGrpSpPr>
-          <p:cNvPr id="11" name="eyebrow">
-            <a:extLst>
-              <a:ext uri="{FF2B5EF4-FFF2-40B4-BE49-F238E27FC236}">
-                <a16:creationId xmlns:a16="http://schemas.microsoft.com/office/drawing/2014/main" id="{CAB9674F-9382-4745-B347-9AB9BBED81F9}"/>
-              </a:ext>
-            </a:extLst>
-          </p:cNvPr>
-          <p:cNvGrpSpPr/>
-          <p:nvPr/>
-        </p:nvGrpSpPr>
-        <p:grpSpPr>
-          <a:xfrm>
-            <a:off x="3662802" y="2611664"/>
-            <a:ext cx="3485494" cy="658589"/>
-            <a:chOff x="4940300" y="3208427"/>
-            <a:chExt cx="2513228" cy="423773"/>
-          </a:xfrm>
-        </p:grpSpPr>
-        <p:pic>
-          <p:nvPicPr>
-            <p:cNvPr id="13" name="Graphic 12">
-              <a:extLst>
-                <a:ext uri="{FF2B5EF4-FFF2-40B4-BE49-F238E27FC236}">
-                  <a16:creationId xmlns:a16="http://schemas.microsoft.com/office/drawing/2014/main" id="{B0EF9019-F6EA-4A42-A3CC-E51C005476E3}"/>
-                </a:ext>
-              </a:extLst>
-            </p:cNvPr>
-            <p:cNvPicPr>
-              <a:picLocks noChangeAspect="1"/>
-            </p:cNvPicPr>
-            <p:nvPr/>
-          </p:nvPicPr>
-          <p:blipFill rotWithShape="1">
-            <a:blip r:embed="rId4">
-              <a:extLst>
-                <a:ext uri="{28A0092B-C50C-407E-A947-70E740481C1C}">
-                  <a14:useLocalDpi xmlns:a14="http://schemas.microsoft.com/office/drawing/2010/main" val="0"/>
-                </a:ext>
-                <a:ext uri="{96DAC541-7B7A-43D3-8B79-37D633B846F1}">
-                  <asvg:svgBlip xmlns:asvg="http://schemas.microsoft.com/office/drawing/2016/SVG/main" r:embed="rId5"/>
-                </a:ext>
-              </a:extLst>
-            </a:blip>
-            <a:srcRect l="38612" t="40175" r="40437" b="52820"/>
-            <a:stretch/>
-          </p:blipFill>
-          <p:spPr>
-            <a:xfrm rot="20126851">
-              <a:off x="4940300" y="3263900"/>
-              <a:ext cx="1101551" cy="368300"/>
-            </a:xfrm>
-            <a:prstGeom prst="rect">
-              <a:avLst/>
-            </a:prstGeom>
-          </p:spPr>
-        </p:pic>
-        <p:pic>
-          <p:nvPicPr>
-            <p:cNvPr id="15" name="Graphic 22">
-              <a:extLst>
-                <a:ext uri="{FF2B5EF4-FFF2-40B4-BE49-F238E27FC236}">
-                  <a16:creationId xmlns:a16="http://schemas.microsoft.com/office/drawing/2014/main" id="{E86EE59C-813A-4C9A-8F13-203F9AA4BFF1}"/>
-                </a:ext>
-              </a:extLst>
-            </p:cNvPr>
-            <p:cNvPicPr>
-              <a:picLocks noChangeAspect="1"/>
-            </p:cNvPicPr>
-            <p:nvPr/>
-          </p:nvPicPr>
-          <p:blipFill rotWithShape="1">
-            <a:blip r:embed="rId4">
-              <a:extLst>
-                <a:ext uri="{28A0092B-C50C-407E-A947-70E740481C1C}">
-                  <a14:useLocalDpi xmlns:a14="http://schemas.microsoft.com/office/drawing/2010/main" val="0"/>
-                </a:ext>
-                <a:ext uri="{96DAC541-7B7A-43D3-8B79-37D633B846F1}">
-                  <asvg:svgBlip xmlns:asvg="http://schemas.microsoft.com/office/drawing/2016/SVG/main" r:embed="rId5"/>
-                </a:ext>
-              </a:extLst>
-            </a:blip>
-            <a:srcRect l="38612" t="40175" r="40437" b="52820"/>
-            <a:stretch/>
-          </p:blipFill>
-          <p:spPr>
-            <a:xfrm rot="2036532">
-              <a:off x="6351977" y="3208427"/>
-              <a:ext cx="1101551" cy="368300"/>
-            </a:xfrm>
-            <a:prstGeom prst="rect">
-              <a:avLst/>
-            </a:prstGeom>
-          </p:spPr>
-        </p:pic>
-      </p:grpSp>
-      <p:pic>
-        <p:nvPicPr>
-          <p:cNvPr id="7" name="Graphic 6">
-            <a:extLst>
-              <a:ext uri="{FF2B5EF4-FFF2-40B4-BE49-F238E27FC236}">
-                <a16:creationId xmlns:a16="http://schemas.microsoft.com/office/drawing/2014/main" id="{8B4C4773-E22D-4E43-9776-A2A52E23B523}"/>
-              </a:ext>
-            </a:extLst>
-          </p:cNvPr>
-          <p:cNvPicPr>
-            <a:picLocks noChangeAspect="1"/>
-          </p:cNvPicPr>
-          <p:nvPr/>
-        </p:nvPicPr>
-        <p:blipFill rotWithShape="1">
-          <a:blip r:embed="rId6">
-            <a:extLst>
-              <a:ext uri="{28A0092B-C50C-407E-A947-70E740481C1C}">
-                <a14:useLocalDpi xmlns:a14="http://schemas.microsoft.com/office/drawing/2010/main" val="0"/>
-              </a:ext>
-              <a:ext uri="{96DAC541-7B7A-43D3-8B79-37D633B846F1}">
-                <asvg:svgBlip xmlns:asvg="http://schemas.microsoft.com/office/drawing/2016/SVG/main" r:embed="rId7"/>
-              </a:ext>
-            </a:extLst>
-          </a:blip>
-          <a:srcRect l="34676" t="13699" r="33814" b="12877"/>
-          <a:stretch/>
-        </p:blipFill>
-        <p:spPr>
-          <a:xfrm>
-            <a:off x="3511108" y="3429000"/>
-            <a:ext cx="287389" cy="473485"/>
-          </a:xfrm>
-          <a:prstGeom prst="rect">
-            <a:avLst/>
-          </a:prstGeom>
-        </p:spPr>
-      </p:pic>
-      <p:pic>
-        <p:nvPicPr>
-          <p:cNvPr id="12" name="Graphic 11">
-            <a:extLst>
-              <a:ext uri="{FF2B5EF4-FFF2-40B4-BE49-F238E27FC236}">
-                <a16:creationId xmlns:a16="http://schemas.microsoft.com/office/drawing/2014/main" id="{FE311968-F3FA-4E5E-8594-0D81D403C39E}"/>
-              </a:ext>
-            </a:extLst>
-          </p:cNvPr>
-          <p:cNvPicPr>
-            <a:picLocks noChangeAspect="1"/>
-          </p:cNvPicPr>
-          <p:nvPr/>
-        </p:nvPicPr>
-        <p:blipFill rotWithShape="1">
-          <a:blip r:embed="rId6">
-            <a:extLst>
-              <a:ext uri="{28A0092B-C50C-407E-A947-70E740481C1C}">
-                <a14:useLocalDpi xmlns:a14="http://schemas.microsoft.com/office/drawing/2010/main" val="0"/>
-              </a:ext>
-              <a:ext uri="{96DAC541-7B7A-43D3-8B79-37D633B846F1}">
-                <asvg:svgBlip xmlns:asvg="http://schemas.microsoft.com/office/drawing/2016/SVG/main" r:embed="rId7"/>
-              </a:ext>
-            </a:extLst>
-          </a:blip>
-          <a:srcRect l="34676" t="13699" r="33814" b="12877"/>
-          <a:stretch/>
-        </p:blipFill>
-        <p:spPr>
-          <a:xfrm>
-            <a:off x="5300125" y="2661110"/>
-            <a:ext cx="287389" cy="473485"/>
-          </a:xfrm>
-          <a:prstGeom prst="rect">
-            <a:avLst/>
-          </a:prstGeom>
-        </p:spPr>
-      </p:pic>
-      <p:pic>
-        <p:nvPicPr>
-          <p:cNvPr id="16" name="Graphic 15">
-            <a:extLst>
-              <a:ext uri="{FF2B5EF4-FFF2-40B4-BE49-F238E27FC236}">
-                <a16:creationId xmlns:a16="http://schemas.microsoft.com/office/drawing/2014/main" id="{32266514-8FDF-455E-8ACB-91477186FC68}"/>
-              </a:ext>
-            </a:extLst>
-          </p:cNvPr>
-          <p:cNvPicPr>
-            <a:picLocks noChangeAspect="1"/>
-          </p:cNvPicPr>
-          <p:nvPr/>
-        </p:nvPicPr>
-        <p:blipFill rotWithShape="1">
-          <a:blip r:embed="rId6">
-            <a:extLst>
-              <a:ext uri="{28A0092B-C50C-407E-A947-70E740481C1C}">
-                <a14:useLocalDpi xmlns:a14="http://schemas.microsoft.com/office/drawing/2010/main" val="0"/>
-              </a:ext>
-              <a:ext uri="{96DAC541-7B7A-43D3-8B79-37D633B846F1}">
-                <asvg:svgBlip xmlns:asvg="http://schemas.microsoft.com/office/drawing/2016/SVG/main" r:embed="rId7"/>
-              </a:ext>
-            </a:extLst>
-          </a:blip>
-          <a:srcRect l="34676" t="13699" r="33814" b="12877"/>
-          <a:stretch/>
-        </p:blipFill>
-        <p:spPr>
-          <a:xfrm>
-            <a:off x="6333164" y="2013339"/>
-            <a:ext cx="287389" cy="473485"/>
-          </a:xfrm>
-          <a:prstGeom prst="rect">
-            <a:avLst/>
-          </a:prstGeom>
-        </p:spPr>
-      </p:pic>
-      <p:pic>
-        <p:nvPicPr>
-          <p:cNvPr id="17" name="Graphic 16">
-            <a:extLst>
-              <a:ext uri="{FF2B5EF4-FFF2-40B4-BE49-F238E27FC236}">
-                <a16:creationId xmlns:a16="http://schemas.microsoft.com/office/drawing/2014/main" id="{1A216963-9529-41A2-9E0F-2DFC06AE364D}"/>
-              </a:ext>
-            </a:extLst>
-          </p:cNvPr>
-          <p:cNvPicPr>
-            <a:picLocks noChangeAspect="1"/>
-          </p:cNvPicPr>
-          <p:nvPr/>
-        </p:nvPicPr>
-        <p:blipFill rotWithShape="1">
-          <a:blip r:embed="rId6">
-            <a:extLst>
-              <a:ext uri="{28A0092B-C50C-407E-A947-70E740481C1C}">
-                <a14:useLocalDpi xmlns:a14="http://schemas.microsoft.com/office/drawing/2010/main" val="0"/>
-              </a:ext>
-              <a:ext uri="{96DAC541-7B7A-43D3-8B79-37D633B846F1}">
-                <asvg:svgBlip xmlns:asvg="http://schemas.microsoft.com/office/drawing/2016/SVG/main" r:embed="rId7"/>
-              </a:ext>
-            </a:extLst>
-          </a:blip>
-          <a:srcRect l="34676" t="13699" r="33814" b="12877"/>
-          <a:stretch/>
-        </p:blipFill>
-        <p:spPr>
-          <a:xfrm>
-            <a:off x="3841349" y="4733143"/>
-            <a:ext cx="287389" cy="473485"/>
-          </a:xfrm>
-          <a:prstGeom prst="rect">
-            <a:avLst/>
-          </a:prstGeom>
-        </p:spPr>
-      </p:pic>
-      <p:pic>
-        <p:nvPicPr>
-          <p:cNvPr id="18" name="Graphic 17">
-            <a:extLst>
-              <a:ext uri="{FF2B5EF4-FFF2-40B4-BE49-F238E27FC236}">
-                <a16:creationId xmlns:a16="http://schemas.microsoft.com/office/drawing/2014/main" id="{4459B258-750A-4EA2-990A-6485888DA122}"/>
-              </a:ext>
-            </a:extLst>
-          </p:cNvPr>
-          <p:cNvPicPr>
-            <a:picLocks noChangeAspect="1"/>
-          </p:cNvPicPr>
-          <p:nvPr/>
-        </p:nvPicPr>
-        <p:blipFill rotWithShape="1">
-          <a:blip r:embed="rId6">
-            <a:extLst>
-              <a:ext uri="{28A0092B-C50C-407E-A947-70E740481C1C}">
-                <a14:useLocalDpi xmlns:a14="http://schemas.microsoft.com/office/drawing/2010/main" val="0"/>
-              </a:ext>
-              <a:ext uri="{96DAC541-7B7A-43D3-8B79-37D633B846F1}">
-                <asvg:svgBlip xmlns:asvg="http://schemas.microsoft.com/office/drawing/2016/SVG/main" r:embed="rId7"/>
-              </a:ext>
-            </a:extLst>
-          </a:blip>
-          <a:srcRect l="34676" t="13699" r="33814" b="12877"/>
-          <a:stretch/>
-        </p:blipFill>
-        <p:spPr>
-          <a:xfrm>
-            <a:off x="7693442" y="3811852"/>
-            <a:ext cx="287389" cy="473485"/>
-          </a:xfrm>
-          <a:prstGeom prst="rect">
-            <a:avLst/>
-          </a:prstGeom>
-        </p:spPr>
-      </p:pic>
-      <p:pic>
-        <p:nvPicPr>
-          <p:cNvPr id="19" name="Graphic 18">
-            <a:extLst>
-              <a:ext uri="{FF2B5EF4-FFF2-40B4-BE49-F238E27FC236}">
-                <a16:creationId xmlns:a16="http://schemas.microsoft.com/office/drawing/2014/main" id="{F95441C8-6957-4187-9F37-7D332A4308DC}"/>
-              </a:ext>
-            </a:extLst>
-          </p:cNvPr>
-          <p:cNvPicPr>
-            <a:picLocks noChangeAspect="1"/>
-          </p:cNvPicPr>
-          <p:nvPr/>
-        </p:nvPicPr>
-        <p:blipFill rotWithShape="1">
-          <a:blip r:embed="rId6">
-            <a:extLst>
-              <a:ext uri="{28A0092B-C50C-407E-A947-70E740481C1C}">
-                <a14:useLocalDpi xmlns:a14="http://schemas.microsoft.com/office/drawing/2010/main" val="0"/>
-              </a:ext>
-              <a:ext uri="{96DAC541-7B7A-43D3-8B79-37D633B846F1}">
-                <asvg:svgBlip xmlns:asvg="http://schemas.microsoft.com/office/drawing/2016/SVG/main" r:embed="rId7"/>
-              </a:ext>
-            </a:extLst>
-          </a:blip>
-          <a:srcRect l="34676" t="13699" r="33814" b="12877"/>
-          <a:stretch/>
-        </p:blipFill>
-        <p:spPr>
-          <a:xfrm>
-            <a:off x="6890544" y="5928047"/>
-            <a:ext cx="287389" cy="473485"/>
-          </a:xfrm>
-          <a:prstGeom prst="rect">
-            <a:avLst/>
-          </a:prstGeom>
-        </p:spPr>
-      </p:pic>
-      <p:grpSp>
-        <p:nvGrpSpPr>
-          <p:cNvPr id="8" name="Group 7">
-            <a:extLst>
-              <a:ext uri="{FF2B5EF4-FFF2-40B4-BE49-F238E27FC236}">
-                <a16:creationId xmlns:a16="http://schemas.microsoft.com/office/drawing/2014/main" id="{765C17A5-2419-4C2E-BA9A-18EAFD974F91}"/>
-              </a:ext>
-            </a:extLst>
-          </p:cNvPr>
-          <p:cNvGrpSpPr/>
-          <p:nvPr/>
-        </p:nvGrpSpPr>
-        <p:grpSpPr>
-          <a:xfrm>
-            <a:off x="6413499" y="2720749"/>
-            <a:ext cx="1836610" cy="6263636"/>
-            <a:chOff x="6413499" y="2720749"/>
-            <a:chExt cx="1836610" cy="6263636"/>
-          </a:xfrm>
-        </p:grpSpPr>
-        <p:sp>
-          <p:nvSpPr>
-            <p:cNvPr id="5" name="Rectangle 4">
-              <a:extLst>
-                <a:ext uri="{FF2B5EF4-FFF2-40B4-BE49-F238E27FC236}">
-                  <a16:creationId xmlns:a16="http://schemas.microsoft.com/office/drawing/2014/main" id="{3D04E7AA-2F55-446A-B782-A17CD6830BEF}"/>
-                </a:ext>
-              </a:extLst>
-            </p:cNvPr>
-            <p:cNvSpPr/>
-            <p:nvPr/>
-          </p:nvSpPr>
-          <p:spPr>
-            <a:xfrm>
-              <a:off x="6413499" y="2720749"/>
-              <a:ext cx="990601" cy="1327846"/>
-            </a:xfrm>
-            <a:prstGeom prst="rect">
-              <a:avLst/>
-            </a:prstGeom>
-            <a:solidFill>
-              <a:schemeClr val="bg1"/>
-            </a:solidFill>
-            <a:ln>
-              <a:noFill/>
-            </a:ln>
-            <a:effectLst>
-              <a:outerShdw blurRad="63500" sx="102000" sy="102000" algn="ctr" rotWithShape="0">
-                <a:prstClr val="black">
-                  <a:alpha val="40000"/>
-                </a:prstClr>
-              </a:outerShdw>
-            </a:effectLst>
-            <a:scene3d>
-              <a:camera prst="perspectiveHeroicExtremeRightFacing"/>
-              <a:lightRig rig="threePt" dir="t"/>
-            </a:scene3d>
-          </p:spPr>
-          <p:style>
-            <a:lnRef idx="2">
-              <a:schemeClr val="accent1">
-                <a:shade val="50000"/>
-              </a:schemeClr>
-            </a:lnRef>
-            <a:fillRef idx="1">
-              <a:schemeClr val="accent1"/>
-            </a:fillRef>
-            <a:effectRef idx="0">
-              <a:schemeClr val="accent1"/>
-            </a:effectRef>
-            <a:fontRef idx="minor">
-              <a:schemeClr val="lt1"/>
-            </a:fontRef>
-          </p:style>
-          <p:txBody>
-            <a:bodyPr rtlCol="0" anchor="ctr"/>
-            <a:lstStyle/>
-            <a:p>
-              <a:pPr algn="ctr"/>
-              <a:endParaRPr lang="pt-PT"/>
-            </a:p>
-          </p:txBody>
-        </p:sp>
-        <p:pic>
-          <p:nvPicPr>
-            <p:cNvPr id="14" name="hand">
-              <a:extLst>
-                <a:ext uri="{FF2B5EF4-FFF2-40B4-BE49-F238E27FC236}">
-                  <a16:creationId xmlns:a16="http://schemas.microsoft.com/office/drawing/2014/main" id="{A302E740-26C4-4E27-944E-F2A0D04A3BDE}"/>
-                </a:ext>
-              </a:extLst>
-            </p:cNvPr>
-            <p:cNvPicPr>
-              <a:picLocks noChangeAspect="1"/>
-            </p:cNvPicPr>
-            <p:nvPr/>
-          </p:nvPicPr>
-          <p:blipFill rotWithShape="1">
-            <a:blip r:embed="rId8">
-              <a:extLst>
-                <a:ext uri="{28A0092B-C50C-407E-A947-70E740481C1C}">
-                  <a14:useLocalDpi xmlns:a14="http://schemas.microsoft.com/office/drawing/2010/main" val="0"/>
-                </a:ext>
-                <a:ext uri="{96DAC541-7B7A-43D3-8B79-37D633B846F1}">
-                  <asvg:svgBlip xmlns:asvg="http://schemas.microsoft.com/office/drawing/2016/SVG/main" r:embed="rId9"/>
-                </a:ext>
-              </a:extLst>
-            </a:blip>
-            <a:srcRect l="42383" t="10528" r="41187" b="8956"/>
-            <a:stretch/>
-          </p:blipFill>
-          <p:spPr>
-            <a:xfrm rot="20594312">
-              <a:off x="6518004" y="2871710"/>
-              <a:ext cx="1732105" cy="6112675"/>
-            </a:xfrm>
-            <a:prstGeom prst="rect">
-              <a:avLst/>
-            </a:prstGeom>
-            <a:effectLst>
-              <a:outerShdw blurRad="63500" sx="102000" sy="102000" algn="ctr" rotWithShape="0">
-                <a:prstClr val="black">
-                  <a:alpha val="40000"/>
-                </a:prstClr>
-              </a:outerShdw>
-            </a:effectLst>
-          </p:spPr>
-        </p:pic>
-      </p:grpSp>
-    </p:spTree>
-    <p:extLst>
-      <p:ext uri="{BB962C8B-B14F-4D97-AF65-F5344CB8AC3E}">
-        <p14:creationId xmlns:p14="http://schemas.microsoft.com/office/powerpoint/2010/main" val="3316454694"/>
-      </p:ext>
-    </p:extLst>
-  </p:cSld>
-  <p:clrMapOvr>
-    <a:masterClrMapping/>
-  </p:clrMapOvr>
-  <mc:AlternateContent xmlns:mc="http://schemas.openxmlformats.org/markup-compatibility/2006" xmlns:p15="http://schemas.microsoft.com/office/powerpoint/2012/main">
-    <mc:Choice Requires="p15">
-      <p:transition xmlns:p14="http://schemas.microsoft.com/office/powerpoint/2010/main" spd="slow" p14:dur="1250">
-        <p15:prstTrans prst="peelOff"/>
-      </p:transition>
-    </mc:Choice>
-    <mc:Fallback xmlns="">
-      <p:transition spd="slow">
-        <p:fade/>
-      </p:transition>
-    </mc:Fallback>
-  </mc:AlternateContent>
-  <p:timing>
-    <p:tnLst>
-      <p:par>
-        <p:cTn id="1" dur="indefinite" restart="never" nodeType="tmRoot">
-          <p:childTnLst>
-            <p:seq concurrent="1" nextAc="seek">
-              <p:cTn id="2" dur="indefinite" nodeType="mainSeq">
-                <p:childTnLst>
-                  <p:par>
-                    <p:cTn id="3" fill="hold">
-                      <p:stCondLst>
-                        <p:cond delay="indefinite"/>
-                        <p:cond evt="onBegin" delay="0">
-                          <p:tn val="2"/>
-                        </p:cond>
-                      </p:stCondLst>
-                      <p:childTnLst>
-                        <p:par>
-                          <p:cTn id="4" fill="hold">
-                            <p:stCondLst>
-                              <p:cond delay="0"/>
-                            </p:stCondLst>
-                            <p:childTnLst>
-                              <p:par>
-                                <p:cTn id="5" presetID="10" presetClass="entr" presetSubtype="0" fill="hold" nodeType="afterEffect">
-                                  <p:stCondLst>
-                                    <p:cond delay="0"/>
-                                  </p:stCondLst>
-                                  <p:childTnLst>
-                                    <p:set>
-                                      <p:cBhvr>
-                                        <p:cTn id="6" dur="1" fill="hold">
-                                          <p:stCondLst>
-                                            <p:cond delay="0"/>
-                                          </p:stCondLst>
-                                        </p:cTn>
-                                        <p:tgtEl>
-                                          <p:spTgt spid="11"/>
-                                        </p:tgtEl>
-                                        <p:attrNameLst>
-                                          <p:attrName>style.visibility</p:attrName>
-                                        </p:attrNameLst>
-                                      </p:cBhvr>
-                                      <p:to>
-                                        <p:strVal val="visible"/>
-                                      </p:to>
-                                    </p:set>
-                                    <p:animEffect transition="in" filter="fade">
-                                      <p:cBhvr>
-                                        <p:cTn id="7" dur="500"/>
-                                        <p:tgtEl>
-                                          <p:spTgt spid="11"/>
-                                        </p:tgtEl>
-                                      </p:cBhvr>
-                                    </p:animEffect>
-                                  </p:childTnLst>
-                                </p:cTn>
-                              </p:par>
-                              <p:par>
-                                <p:cTn id="8" presetID="10" presetClass="entr" presetSubtype="0" fill="hold" nodeType="withEffect">
-                                  <p:stCondLst>
-                                    <p:cond delay="0"/>
-                                  </p:stCondLst>
-                                  <p:childTnLst>
-                                    <p:set>
-                                      <p:cBhvr>
-                                        <p:cTn id="9" dur="1" fill="hold">
-                                          <p:stCondLst>
-                                            <p:cond delay="0"/>
-                                          </p:stCondLst>
-                                        </p:cTn>
-                                        <p:tgtEl>
-                                          <p:spTgt spid="9"/>
-                                        </p:tgtEl>
-                                        <p:attrNameLst>
-                                          <p:attrName>style.visibility</p:attrName>
-                                        </p:attrNameLst>
-                                      </p:cBhvr>
-                                      <p:to>
-                                        <p:strVal val="visible"/>
-                                      </p:to>
-                                    </p:set>
-                                    <p:animEffect transition="in" filter="fade">
-                                      <p:cBhvr>
-                                        <p:cTn id="10" dur="500"/>
-                                        <p:tgtEl>
-                                          <p:spTgt spid="9"/>
-                                        </p:tgtEl>
-                                      </p:cBhvr>
-                                    </p:animEffect>
-                                  </p:childTnLst>
-                                </p:cTn>
-                              </p:par>
-                              <p:par>
-                                <p:cTn id="11" presetID="10" presetClass="entr" presetSubtype="0" fill="hold" grpId="0" nodeType="withEffect">
-                                  <p:stCondLst>
-                                    <p:cond delay="0"/>
-                                  </p:stCondLst>
-                                  <p:childTnLst>
-                                    <p:set>
-                                      <p:cBhvr>
-                                        <p:cTn id="12" dur="1" fill="hold">
-                                          <p:stCondLst>
-                                            <p:cond delay="0"/>
-                                          </p:stCondLst>
-                                        </p:cTn>
-                                        <p:tgtEl>
-                                          <p:spTgt spid="10"/>
-                                        </p:tgtEl>
-                                        <p:attrNameLst>
-                                          <p:attrName>style.visibility</p:attrName>
-                                        </p:attrNameLst>
-                                      </p:cBhvr>
-                                      <p:to>
-                                        <p:strVal val="visible"/>
-                                      </p:to>
-                                    </p:set>
-                                    <p:animEffect transition="in" filter="fade">
-                                      <p:cBhvr>
-                                        <p:cTn id="13" dur="500"/>
-                                        <p:tgtEl>
-                                          <p:spTgt spid="10"/>
-                                        </p:tgtEl>
-                                      </p:cBhvr>
-                                    </p:animEffect>
-                                  </p:childTnLst>
-                                </p:cTn>
-                              </p:par>
-                            </p:childTnLst>
-                          </p:cTn>
-                        </p:par>
-                        <p:par>
-                          <p:cTn id="14" fill="hold">
-                            <p:stCondLst>
-                              <p:cond delay="500"/>
-                            </p:stCondLst>
-                            <p:childTnLst>
-                              <p:par>
-                                <p:cTn id="15" presetID="42" presetClass="path" presetSubtype="0" repeatCount="1600" accel="50000" decel="50000" autoRev="1" fill="hold" nodeType="afterEffect">
-                                  <p:stCondLst>
-                                    <p:cond delay="0"/>
-                                  </p:stCondLst>
-                                  <p:childTnLst>
-                                    <p:animMotion origin="layout" path="M 6.25E-7 -3.7037E-6 L 0.00143 -0.02569 " pathEditMode="relative" rAng="0" ptsTypes="AA">
-                                      <p:cBhvr>
-                                        <p:cTn id="16" dur="3000" fill="hold"/>
-                                        <p:tgtEl>
-                                          <p:spTgt spid="11"/>
-                                        </p:tgtEl>
-                                        <p:attrNameLst>
-                                          <p:attrName>ppt_x</p:attrName>
-                                          <p:attrName>ppt_y</p:attrName>
-                                        </p:attrNameLst>
-                                      </p:cBhvr>
-                                      <p:rCtr x="65" y="-1296"/>
-                                    </p:animMotion>
-                                  </p:childTnLst>
-                                </p:cTn>
-                              </p:par>
-                              <p:par>
-                                <p:cTn id="17" presetID="6" presetClass="emph" presetSubtype="0" repeatCount="indefinite" autoRev="1" fill="hold" grpId="1" nodeType="withEffect">
-                                  <p:stCondLst>
-                                    <p:cond delay="0"/>
-                                  </p:stCondLst>
-                                  <p:childTnLst>
-                                    <p:animScale>
-                                      <p:cBhvr>
-                                        <p:cTn id="18" dur="3000" fill="hold"/>
-                                        <p:tgtEl>
-                                          <p:spTgt spid="10"/>
-                                        </p:tgtEl>
-                                      </p:cBhvr>
-                                      <p:by x="120000" y="120000"/>
-                                    </p:animScale>
-                                  </p:childTnLst>
-                                </p:cTn>
-                              </p:par>
-                              <p:par>
-                                <p:cTn id="19" presetID="2" presetClass="entr" presetSubtype="4" fill="hold" nodeType="withEffect">
-                                  <p:stCondLst>
-                                    <p:cond delay="0"/>
-                                  </p:stCondLst>
-                                  <p:childTnLst>
-                                    <p:set>
-                                      <p:cBhvr>
-                                        <p:cTn id="20" dur="1" fill="hold">
-                                          <p:stCondLst>
-                                            <p:cond delay="0"/>
-                                          </p:stCondLst>
-                                        </p:cTn>
-                                        <p:tgtEl>
-                                          <p:spTgt spid="8"/>
-                                        </p:tgtEl>
-                                        <p:attrNameLst>
-                                          <p:attrName>style.visibility</p:attrName>
-                                        </p:attrNameLst>
-                                      </p:cBhvr>
-                                      <p:to>
-                                        <p:strVal val="visible"/>
-                                      </p:to>
-                                    </p:set>
-                                    <p:anim calcmode="lin" valueType="num">
-                                      <p:cBhvr additive="base">
-                                        <p:cTn id="21" dur="500" fill="hold"/>
-                                        <p:tgtEl>
-                                          <p:spTgt spid="8"/>
-                                        </p:tgtEl>
-                                        <p:attrNameLst>
-                                          <p:attrName>ppt_x</p:attrName>
-                                        </p:attrNameLst>
-                                      </p:cBhvr>
-                                      <p:tavLst>
-                                        <p:tav tm="0">
-                                          <p:val>
-                                            <p:strVal val="#ppt_x"/>
-                                          </p:val>
-                                        </p:tav>
-                                        <p:tav tm="100000">
-                                          <p:val>
-                                            <p:strVal val="#ppt_x"/>
-                                          </p:val>
-                                        </p:tav>
-                                      </p:tavLst>
-                                    </p:anim>
-                                    <p:anim calcmode="lin" valueType="num">
-                                      <p:cBhvr additive="base">
-                                        <p:cTn id="22" dur="500" fill="hold"/>
-                                        <p:tgtEl>
-                                          <p:spTgt spid="8"/>
-                                        </p:tgtEl>
-                                        <p:attrNameLst>
-                                          <p:attrName>ppt_y</p:attrName>
-                                        </p:attrNameLst>
-                                      </p:cBhvr>
-                                      <p:tavLst>
-                                        <p:tav tm="0">
-                                          <p:val>
-                                            <p:strVal val="1+#ppt_h/2"/>
-                                          </p:val>
-                                        </p:tav>
-                                        <p:tav tm="100000">
-                                          <p:val>
-                                            <p:strVal val="#ppt_y"/>
-                                          </p:val>
-                                        </p:tav>
-                                      </p:tavLst>
-                                    </p:anim>
-                                  </p:childTnLst>
-                                </p:cTn>
-                              </p:par>
-                              <p:par>
-                                <p:cTn id="23" presetID="32" presetClass="emph" presetSubtype="0" repeatCount="indefinite" fill="hold" nodeType="withEffect">
-                                  <p:stCondLst>
-                                    <p:cond delay="0"/>
-                                  </p:stCondLst>
-                                  <p:childTnLst>
-                                    <p:animRot by="120000">
-                                      <p:cBhvr>
-                                        <p:cTn id="24" dur="300" fill="hold">
-                                          <p:stCondLst>
-                                            <p:cond delay="0"/>
-                                          </p:stCondLst>
-                                        </p:cTn>
-                                        <p:tgtEl>
-                                          <p:spTgt spid="8"/>
-                                        </p:tgtEl>
-                                        <p:attrNameLst>
-                                          <p:attrName>r</p:attrName>
-                                        </p:attrNameLst>
-                                      </p:cBhvr>
-                                    </p:animRot>
-                                    <p:animRot by="-240000">
-                                      <p:cBhvr>
-                                        <p:cTn id="25" dur="600" fill="hold">
-                                          <p:stCondLst>
-                                            <p:cond delay="600"/>
-                                          </p:stCondLst>
-                                        </p:cTn>
-                                        <p:tgtEl>
-                                          <p:spTgt spid="8"/>
-                                        </p:tgtEl>
-                                        <p:attrNameLst>
-                                          <p:attrName>r</p:attrName>
-                                        </p:attrNameLst>
-                                      </p:cBhvr>
-                                    </p:animRot>
-                                    <p:animRot by="240000">
-                                      <p:cBhvr>
-                                        <p:cTn id="26" dur="600" fill="hold">
-                                          <p:stCondLst>
-                                            <p:cond delay="1200"/>
-                                          </p:stCondLst>
-                                        </p:cTn>
-                                        <p:tgtEl>
-                                          <p:spTgt spid="8"/>
-                                        </p:tgtEl>
-                                        <p:attrNameLst>
-                                          <p:attrName>r</p:attrName>
-                                        </p:attrNameLst>
-                                      </p:cBhvr>
-                                    </p:animRot>
-                                    <p:animRot by="-240000">
-                                      <p:cBhvr>
-                                        <p:cTn id="27" dur="600" fill="hold">
-                                          <p:stCondLst>
-                                            <p:cond delay="1800"/>
-                                          </p:stCondLst>
-                                        </p:cTn>
-                                        <p:tgtEl>
-                                          <p:spTgt spid="8"/>
-                                        </p:tgtEl>
-                                        <p:attrNameLst>
-                                          <p:attrName>r</p:attrName>
-                                        </p:attrNameLst>
-                                      </p:cBhvr>
-                                    </p:animRot>
-                                    <p:animRot by="120000">
-                                      <p:cBhvr>
-                                        <p:cTn id="28" dur="600" fill="hold">
-                                          <p:stCondLst>
-                                            <p:cond delay="2400"/>
-                                          </p:stCondLst>
-                                        </p:cTn>
-                                        <p:tgtEl>
-                                          <p:spTgt spid="8"/>
-                                        </p:tgtEl>
-                                        <p:attrNameLst>
-                                          <p:attrName>r</p:attrName>
-                                        </p:attrNameLst>
-                                      </p:cBhvr>
-                                    </p:animRot>
-                                  </p:childTnLst>
-                                </p:cTn>
-                              </p:par>
-                              <p:par>
-                                <p:cTn id="29" presetID="10" presetClass="entr" presetSubtype="0" fill="hold" nodeType="withEffect">
-                                  <p:stCondLst>
-                                    <p:cond delay="0"/>
-                                  </p:stCondLst>
-                                  <p:childTnLst>
-                                    <p:set>
-                                      <p:cBhvr>
-                                        <p:cTn id="30" dur="1" fill="hold">
-                                          <p:stCondLst>
-                                            <p:cond delay="0"/>
-                                          </p:stCondLst>
-                                        </p:cTn>
-                                        <p:tgtEl>
-                                          <p:spTgt spid="19"/>
-                                        </p:tgtEl>
-                                        <p:attrNameLst>
-                                          <p:attrName>style.visibility</p:attrName>
-                                        </p:attrNameLst>
-                                      </p:cBhvr>
-                                      <p:to>
-                                        <p:strVal val="visible"/>
-                                      </p:to>
-                                    </p:set>
-                                    <p:animEffect transition="in" filter="fade">
-                                      <p:cBhvr>
-                                        <p:cTn id="31" dur="500"/>
-                                        <p:tgtEl>
-                                          <p:spTgt spid="19"/>
-                                        </p:tgtEl>
-                                      </p:cBhvr>
-                                    </p:animEffect>
-                                  </p:childTnLst>
-                                </p:cTn>
-                              </p:par>
-                              <p:par>
-                                <p:cTn id="32" presetID="10" presetClass="entr" presetSubtype="0" fill="hold" nodeType="withEffect">
-                                  <p:stCondLst>
-                                    <p:cond delay="0"/>
-                                  </p:stCondLst>
-                                  <p:childTnLst>
-                                    <p:set>
-                                      <p:cBhvr>
-                                        <p:cTn id="33" dur="1" fill="hold">
-                                          <p:stCondLst>
-                                            <p:cond delay="0"/>
-                                          </p:stCondLst>
-                                        </p:cTn>
-                                        <p:tgtEl>
-                                          <p:spTgt spid="18"/>
-                                        </p:tgtEl>
-                                        <p:attrNameLst>
-                                          <p:attrName>style.visibility</p:attrName>
-                                        </p:attrNameLst>
-                                      </p:cBhvr>
-                                      <p:to>
-                                        <p:strVal val="visible"/>
-                                      </p:to>
-                                    </p:set>
-                                    <p:animEffect transition="in" filter="fade">
-                                      <p:cBhvr>
-                                        <p:cTn id="34" dur="500"/>
-                                        <p:tgtEl>
-                                          <p:spTgt spid="18"/>
-                                        </p:tgtEl>
-                                      </p:cBhvr>
-                                    </p:animEffect>
-                                  </p:childTnLst>
-                                </p:cTn>
-                              </p:par>
-                              <p:par>
-                                <p:cTn id="35" presetID="10" presetClass="entr" presetSubtype="0" fill="hold" nodeType="withEffect">
-                                  <p:stCondLst>
-                                    <p:cond delay="0"/>
-                                  </p:stCondLst>
-                                  <p:childTnLst>
-                                    <p:set>
-                                      <p:cBhvr>
-                                        <p:cTn id="36" dur="1" fill="hold">
-                                          <p:stCondLst>
-                                            <p:cond delay="0"/>
-                                          </p:stCondLst>
-                                        </p:cTn>
-                                        <p:tgtEl>
-                                          <p:spTgt spid="17"/>
-                                        </p:tgtEl>
-                                        <p:attrNameLst>
-                                          <p:attrName>style.visibility</p:attrName>
-                                        </p:attrNameLst>
-                                      </p:cBhvr>
-                                      <p:to>
-                                        <p:strVal val="visible"/>
-                                      </p:to>
-                                    </p:set>
-                                    <p:animEffect transition="in" filter="fade">
-                                      <p:cBhvr>
-                                        <p:cTn id="37" dur="500"/>
-                                        <p:tgtEl>
-                                          <p:spTgt spid="17"/>
-                                        </p:tgtEl>
-                                      </p:cBhvr>
-                                    </p:animEffect>
-                                  </p:childTnLst>
-                                </p:cTn>
-                              </p:par>
-                              <p:par>
-                                <p:cTn id="38" presetID="10" presetClass="entr" presetSubtype="0" fill="hold" nodeType="withEffect">
-                                  <p:stCondLst>
-                                    <p:cond delay="0"/>
-                                  </p:stCondLst>
-                                  <p:childTnLst>
-                                    <p:set>
-                                      <p:cBhvr>
-                                        <p:cTn id="39" dur="1" fill="hold">
-                                          <p:stCondLst>
-                                            <p:cond delay="0"/>
-                                          </p:stCondLst>
-                                        </p:cTn>
-                                        <p:tgtEl>
-                                          <p:spTgt spid="16"/>
-                                        </p:tgtEl>
-                                        <p:attrNameLst>
-                                          <p:attrName>style.visibility</p:attrName>
-                                        </p:attrNameLst>
-                                      </p:cBhvr>
-                                      <p:to>
-                                        <p:strVal val="visible"/>
-                                      </p:to>
-                                    </p:set>
-                                    <p:animEffect transition="in" filter="fade">
-                                      <p:cBhvr>
-                                        <p:cTn id="40" dur="500"/>
-                                        <p:tgtEl>
-                                          <p:spTgt spid="16"/>
-                                        </p:tgtEl>
-                                      </p:cBhvr>
-                                    </p:animEffect>
-                                  </p:childTnLst>
-                                </p:cTn>
-                              </p:par>
-                              <p:par>
-                                <p:cTn id="41" presetID="10" presetClass="entr" presetSubtype="0" fill="hold" nodeType="withEffect">
-                                  <p:stCondLst>
-                                    <p:cond delay="0"/>
-                                  </p:stCondLst>
-                                  <p:childTnLst>
-                                    <p:set>
-                                      <p:cBhvr>
-                                        <p:cTn id="42" dur="1" fill="hold">
-                                          <p:stCondLst>
-                                            <p:cond delay="0"/>
-                                          </p:stCondLst>
-                                        </p:cTn>
-                                        <p:tgtEl>
-                                          <p:spTgt spid="12"/>
-                                        </p:tgtEl>
-                                        <p:attrNameLst>
-                                          <p:attrName>style.visibility</p:attrName>
-                                        </p:attrNameLst>
-                                      </p:cBhvr>
-                                      <p:to>
-                                        <p:strVal val="visible"/>
-                                      </p:to>
-                                    </p:set>
-                                    <p:animEffect transition="in" filter="fade">
-                                      <p:cBhvr>
-                                        <p:cTn id="43" dur="500"/>
-                                        <p:tgtEl>
-                                          <p:spTgt spid="12"/>
-                                        </p:tgtEl>
-                                      </p:cBhvr>
-                                    </p:animEffect>
-                                  </p:childTnLst>
-                                </p:cTn>
-                              </p:par>
-                              <p:par>
-                                <p:cTn id="44" presetID="10" presetClass="entr" presetSubtype="0" fill="hold" nodeType="withEffect">
-                                  <p:stCondLst>
-                                    <p:cond delay="0"/>
-                                  </p:stCondLst>
-                                  <p:childTnLst>
-                                    <p:set>
-                                      <p:cBhvr>
-                                        <p:cTn id="45" dur="1" fill="hold">
-                                          <p:stCondLst>
-                                            <p:cond delay="0"/>
-                                          </p:stCondLst>
-                                        </p:cTn>
-                                        <p:tgtEl>
-                                          <p:spTgt spid="7"/>
-                                        </p:tgtEl>
-                                        <p:attrNameLst>
-                                          <p:attrName>style.visibility</p:attrName>
-                                        </p:attrNameLst>
-                                      </p:cBhvr>
-                                      <p:to>
-                                        <p:strVal val="visible"/>
-                                      </p:to>
-                                    </p:set>
-                                    <p:animEffect transition="in" filter="fade">
-                                      <p:cBhvr>
-                                        <p:cTn id="46" dur="500"/>
-                                        <p:tgtEl>
-                                          <p:spTgt spid="7"/>
-                                        </p:tgtEl>
-                                      </p:cBhvr>
-                                    </p:animEffect>
-                                  </p:childTnLst>
-                                </p:cTn>
-                              </p:par>
-                              <p:par>
-                                <p:cTn id="47" presetID="2" presetClass="exit" presetSubtype="4" repeatCount="indefinite" fill="hold" nodeType="withEffect">
-                                  <p:stCondLst>
-                                    <p:cond delay="300"/>
-                                  </p:stCondLst>
-                                  <p:childTnLst>
-                                    <p:anim calcmode="lin" valueType="num">
-                                      <p:cBhvr additive="base">
-                                        <p:cTn id="48" dur="2000"/>
-                                        <p:tgtEl>
-                                          <p:spTgt spid="19"/>
-                                        </p:tgtEl>
-                                        <p:attrNameLst>
-                                          <p:attrName>ppt_x</p:attrName>
-                                        </p:attrNameLst>
-                                      </p:cBhvr>
-                                      <p:tavLst>
-                                        <p:tav tm="0">
-                                          <p:val>
-                                            <p:strVal val="ppt_x"/>
-                                          </p:val>
-                                        </p:tav>
-                                        <p:tav tm="100000">
-                                          <p:val>
-                                            <p:strVal val="ppt_x"/>
-                                          </p:val>
-                                        </p:tav>
-                                      </p:tavLst>
-                                    </p:anim>
-                                    <p:anim calcmode="lin" valueType="num">
-                                      <p:cBhvr additive="base">
-                                        <p:cTn id="49" dur="2000"/>
-                                        <p:tgtEl>
-                                          <p:spTgt spid="19"/>
-                                        </p:tgtEl>
-                                        <p:attrNameLst>
-                                          <p:attrName>ppt_y</p:attrName>
-                                        </p:attrNameLst>
-                                      </p:cBhvr>
-                                      <p:tavLst>
-                                        <p:tav tm="0">
-                                          <p:val>
-                                            <p:strVal val="ppt_y"/>
-                                          </p:val>
-                                        </p:tav>
-                                        <p:tav tm="100000">
-                                          <p:val>
-                                            <p:strVal val="1+ppt_h/2"/>
-                                          </p:val>
-                                        </p:tav>
-                                      </p:tavLst>
-                                    </p:anim>
-                                    <p:set>
-                                      <p:cBhvr>
-                                        <p:cTn id="50" dur="1" fill="hold">
-                                          <p:stCondLst>
-                                            <p:cond delay="1999"/>
-                                          </p:stCondLst>
-                                        </p:cTn>
-                                        <p:tgtEl>
-                                          <p:spTgt spid="19"/>
-                                        </p:tgtEl>
-                                        <p:attrNameLst>
-                                          <p:attrName>style.visibility</p:attrName>
-                                        </p:attrNameLst>
-                                      </p:cBhvr>
-                                      <p:to>
-                                        <p:strVal val="hidden"/>
-                                      </p:to>
-                                    </p:set>
-                                  </p:childTnLst>
-                                </p:cTn>
-                              </p:par>
-                              <p:par>
-                                <p:cTn id="51" presetID="2" presetClass="exit" presetSubtype="4" repeatCount="indefinite" fill="hold" nodeType="withEffect">
-                                  <p:stCondLst>
-                                    <p:cond delay="0"/>
-                                  </p:stCondLst>
-                                  <p:childTnLst>
-                                    <p:anim calcmode="lin" valueType="num">
-                                      <p:cBhvr additive="base">
-                                        <p:cTn id="52" dur="2000"/>
-                                        <p:tgtEl>
-                                          <p:spTgt spid="18"/>
-                                        </p:tgtEl>
-                                        <p:attrNameLst>
-                                          <p:attrName>ppt_x</p:attrName>
-                                        </p:attrNameLst>
-                                      </p:cBhvr>
-                                      <p:tavLst>
-                                        <p:tav tm="0">
-                                          <p:val>
-                                            <p:strVal val="ppt_x"/>
-                                          </p:val>
-                                        </p:tav>
-                                        <p:tav tm="100000">
-                                          <p:val>
-                                            <p:strVal val="ppt_x"/>
-                                          </p:val>
-                                        </p:tav>
-                                      </p:tavLst>
-                                    </p:anim>
-                                    <p:anim calcmode="lin" valueType="num">
-                                      <p:cBhvr additive="base">
-                                        <p:cTn id="53" dur="2000"/>
-                                        <p:tgtEl>
-                                          <p:spTgt spid="18"/>
-                                        </p:tgtEl>
-                                        <p:attrNameLst>
-                                          <p:attrName>ppt_y</p:attrName>
-                                        </p:attrNameLst>
-                                      </p:cBhvr>
-                                      <p:tavLst>
-                                        <p:tav tm="0">
-                                          <p:val>
-                                            <p:strVal val="ppt_y"/>
-                                          </p:val>
-                                        </p:tav>
-                                        <p:tav tm="100000">
-                                          <p:val>
-                                            <p:strVal val="1+ppt_h/2"/>
-                                          </p:val>
-                                        </p:tav>
-                                      </p:tavLst>
-                                    </p:anim>
-                                    <p:set>
-                                      <p:cBhvr>
-                                        <p:cTn id="54" dur="1" fill="hold">
-                                          <p:stCondLst>
-                                            <p:cond delay="1999"/>
-                                          </p:stCondLst>
-                                        </p:cTn>
-                                        <p:tgtEl>
-                                          <p:spTgt spid="18"/>
-                                        </p:tgtEl>
-                                        <p:attrNameLst>
-                                          <p:attrName>style.visibility</p:attrName>
-                                        </p:attrNameLst>
-                                      </p:cBhvr>
-                                      <p:to>
-                                        <p:strVal val="hidden"/>
-                                      </p:to>
-                                    </p:set>
-                                  </p:childTnLst>
-                                </p:cTn>
-                              </p:par>
-                              <p:par>
-                                <p:cTn id="55" presetID="2" presetClass="exit" presetSubtype="4" repeatCount="indefinite" fill="hold" nodeType="withEffect">
-                                  <p:stCondLst>
-                                    <p:cond delay="1000"/>
-                                  </p:stCondLst>
-                                  <p:childTnLst>
-                                    <p:anim calcmode="lin" valueType="num">
-                                      <p:cBhvr additive="base">
-                                        <p:cTn id="56" dur="2000"/>
-                                        <p:tgtEl>
-                                          <p:spTgt spid="17"/>
-                                        </p:tgtEl>
-                                        <p:attrNameLst>
-                                          <p:attrName>ppt_x</p:attrName>
-                                        </p:attrNameLst>
-                                      </p:cBhvr>
-                                      <p:tavLst>
-                                        <p:tav tm="0">
-                                          <p:val>
-                                            <p:strVal val="ppt_x"/>
-                                          </p:val>
-                                        </p:tav>
-                                        <p:tav tm="100000">
-                                          <p:val>
-                                            <p:strVal val="ppt_x"/>
-                                          </p:val>
-                                        </p:tav>
-                                      </p:tavLst>
-                                    </p:anim>
-                                    <p:anim calcmode="lin" valueType="num">
-                                      <p:cBhvr additive="base">
-                                        <p:cTn id="57" dur="2000"/>
-                                        <p:tgtEl>
-                                          <p:spTgt spid="17"/>
-                                        </p:tgtEl>
-                                        <p:attrNameLst>
-                                          <p:attrName>ppt_y</p:attrName>
-                                        </p:attrNameLst>
-                                      </p:cBhvr>
-                                      <p:tavLst>
-                                        <p:tav tm="0">
-                                          <p:val>
-                                            <p:strVal val="ppt_y"/>
-                                          </p:val>
-                                        </p:tav>
-                                        <p:tav tm="100000">
-                                          <p:val>
-                                            <p:strVal val="1+ppt_h/2"/>
-                                          </p:val>
-                                        </p:tav>
-                                      </p:tavLst>
-                                    </p:anim>
-                                    <p:set>
-                                      <p:cBhvr>
-                                        <p:cTn id="58" dur="1" fill="hold">
-                                          <p:stCondLst>
-                                            <p:cond delay="1999"/>
-                                          </p:stCondLst>
-                                        </p:cTn>
-                                        <p:tgtEl>
-                                          <p:spTgt spid="17"/>
-                                        </p:tgtEl>
-                                        <p:attrNameLst>
-                                          <p:attrName>style.visibility</p:attrName>
-                                        </p:attrNameLst>
-                                      </p:cBhvr>
-                                      <p:to>
-                                        <p:strVal val="hidden"/>
-                                      </p:to>
-                                    </p:set>
-                                  </p:childTnLst>
-                                </p:cTn>
-                              </p:par>
-                              <p:par>
-                                <p:cTn id="59" presetID="2" presetClass="exit" presetSubtype="4" repeatCount="indefinite" fill="hold" nodeType="withEffect">
-                                  <p:stCondLst>
-                                    <p:cond delay="400"/>
-                                  </p:stCondLst>
-                                  <p:childTnLst>
-                                    <p:anim calcmode="lin" valueType="num">
-                                      <p:cBhvr additive="base">
-                                        <p:cTn id="60" dur="2000"/>
-                                        <p:tgtEl>
-                                          <p:spTgt spid="16"/>
-                                        </p:tgtEl>
-                                        <p:attrNameLst>
-                                          <p:attrName>ppt_x</p:attrName>
-                                        </p:attrNameLst>
-                                      </p:cBhvr>
-                                      <p:tavLst>
-                                        <p:tav tm="0">
-                                          <p:val>
-                                            <p:strVal val="ppt_x"/>
-                                          </p:val>
-                                        </p:tav>
-                                        <p:tav tm="100000">
-                                          <p:val>
-                                            <p:strVal val="ppt_x"/>
-                                          </p:val>
-                                        </p:tav>
-                                      </p:tavLst>
-                                    </p:anim>
-                                    <p:anim calcmode="lin" valueType="num">
-                                      <p:cBhvr additive="base">
-                                        <p:cTn id="61" dur="2000"/>
-                                        <p:tgtEl>
-                                          <p:spTgt spid="16"/>
-                                        </p:tgtEl>
-                                        <p:attrNameLst>
-                                          <p:attrName>ppt_y</p:attrName>
-                                        </p:attrNameLst>
-                                      </p:cBhvr>
-                                      <p:tavLst>
-                                        <p:tav tm="0">
-                                          <p:val>
-                                            <p:strVal val="ppt_y"/>
-                                          </p:val>
-                                        </p:tav>
-                                        <p:tav tm="100000">
-                                          <p:val>
-                                            <p:strVal val="1+ppt_h/2"/>
-                                          </p:val>
-                                        </p:tav>
-                                      </p:tavLst>
-                                    </p:anim>
-                                    <p:set>
-                                      <p:cBhvr>
-                                        <p:cTn id="62" dur="1" fill="hold">
-                                          <p:stCondLst>
-                                            <p:cond delay="1999"/>
-                                          </p:stCondLst>
-                                        </p:cTn>
-                                        <p:tgtEl>
-                                          <p:spTgt spid="16"/>
-                                        </p:tgtEl>
-                                        <p:attrNameLst>
-                                          <p:attrName>style.visibility</p:attrName>
-                                        </p:attrNameLst>
-                                      </p:cBhvr>
-                                      <p:to>
-                                        <p:strVal val="hidden"/>
-                                      </p:to>
-                                    </p:set>
-                                  </p:childTnLst>
-                                </p:cTn>
-                              </p:par>
-                              <p:par>
-                                <p:cTn id="63" presetID="2" presetClass="exit" presetSubtype="4" repeatCount="indefinite" fill="hold" nodeType="withEffect">
-                                  <p:stCondLst>
-                                    <p:cond delay="800"/>
-                                  </p:stCondLst>
-                                  <p:childTnLst>
-                                    <p:anim calcmode="lin" valueType="num">
-                                      <p:cBhvr additive="base">
-                                        <p:cTn id="64" dur="2000"/>
-                                        <p:tgtEl>
-                                          <p:spTgt spid="12"/>
-                                        </p:tgtEl>
-                                        <p:attrNameLst>
-                                          <p:attrName>ppt_x</p:attrName>
-                                        </p:attrNameLst>
-                                      </p:cBhvr>
-                                      <p:tavLst>
-                                        <p:tav tm="0">
-                                          <p:val>
-                                            <p:strVal val="ppt_x"/>
-                                          </p:val>
-                                        </p:tav>
-                                        <p:tav tm="100000">
-                                          <p:val>
-                                            <p:strVal val="ppt_x"/>
-                                          </p:val>
-                                        </p:tav>
-                                      </p:tavLst>
-                                    </p:anim>
-                                    <p:anim calcmode="lin" valueType="num">
-                                      <p:cBhvr additive="base">
-                                        <p:cTn id="65" dur="2000"/>
-                                        <p:tgtEl>
-                                          <p:spTgt spid="12"/>
-                                        </p:tgtEl>
-                                        <p:attrNameLst>
-                                          <p:attrName>ppt_y</p:attrName>
-                                        </p:attrNameLst>
-                                      </p:cBhvr>
-                                      <p:tavLst>
-                                        <p:tav tm="0">
-                                          <p:val>
-                                            <p:strVal val="ppt_y"/>
-                                          </p:val>
-                                        </p:tav>
-                                        <p:tav tm="100000">
-                                          <p:val>
-                                            <p:strVal val="1+ppt_h/2"/>
-                                          </p:val>
-                                        </p:tav>
-                                      </p:tavLst>
-                                    </p:anim>
-                                    <p:set>
-                                      <p:cBhvr>
-                                        <p:cTn id="66" dur="1" fill="hold">
-                                          <p:stCondLst>
-                                            <p:cond delay="1999"/>
-                                          </p:stCondLst>
-                                        </p:cTn>
-                                        <p:tgtEl>
-                                          <p:spTgt spid="12"/>
-                                        </p:tgtEl>
-                                        <p:attrNameLst>
-                                          <p:attrName>style.visibility</p:attrName>
-                                        </p:attrNameLst>
-                                      </p:cBhvr>
-                                      <p:to>
-                                        <p:strVal val="hidden"/>
-                                      </p:to>
-                                    </p:set>
-                                  </p:childTnLst>
-                                </p:cTn>
-                              </p:par>
-                              <p:par>
-                                <p:cTn id="67" presetID="2" presetClass="exit" presetSubtype="4" repeatCount="indefinite" fill="hold" nodeType="withEffect">
-                                  <p:stCondLst>
-                                    <p:cond delay="200"/>
-                                  </p:stCondLst>
-                                  <p:childTnLst>
-                                    <p:anim calcmode="lin" valueType="num">
-                                      <p:cBhvr additive="base">
-                                        <p:cTn id="68" dur="2000"/>
-                                        <p:tgtEl>
-                                          <p:spTgt spid="7"/>
-                                        </p:tgtEl>
-                                        <p:attrNameLst>
-                                          <p:attrName>ppt_x</p:attrName>
-                                        </p:attrNameLst>
-                                      </p:cBhvr>
-                                      <p:tavLst>
-                                        <p:tav tm="0">
-                                          <p:val>
-                                            <p:strVal val="ppt_x"/>
-                                          </p:val>
-                                        </p:tav>
-                                        <p:tav tm="100000">
-                                          <p:val>
-                                            <p:strVal val="ppt_x"/>
-                                          </p:val>
-                                        </p:tav>
-                                      </p:tavLst>
-                                    </p:anim>
-                                    <p:anim calcmode="lin" valueType="num">
-                                      <p:cBhvr additive="base">
-                                        <p:cTn id="69" dur="2000"/>
-                                        <p:tgtEl>
-                                          <p:spTgt spid="7"/>
-                                        </p:tgtEl>
-                                        <p:attrNameLst>
-                                          <p:attrName>ppt_y</p:attrName>
-                                        </p:attrNameLst>
-                                      </p:cBhvr>
-                                      <p:tavLst>
-                                        <p:tav tm="0">
-                                          <p:val>
-                                            <p:strVal val="ppt_y"/>
-                                          </p:val>
-                                        </p:tav>
-                                        <p:tav tm="100000">
-                                          <p:val>
-                                            <p:strVal val="1+ppt_h/2"/>
-                                          </p:val>
-                                        </p:tav>
-                                      </p:tavLst>
-                                    </p:anim>
-                                    <p:set>
-                                      <p:cBhvr>
-                                        <p:cTn id="70" dur="1" fill="hold">
-                                          <p:stCondLst>
-                                            <p:cond delay="1999"/>
-                                          </p:stCondLst>
-                                        </p:cTn>
-                                        <p:tgtEl>
-                                          <p:spTgt spid="7"/>
-                                        </p:tgtEl>
-                                        <p:attrNameLst>
-                                          <p:attrName>style.visibility</p:attrName>
-                                        </p:attrNameLst>
-                                      </p:cBhvr>
-                                      <p:to>
-                                        <p:strVal val="hidden"/>
-                                      </p:to>
-                                    </p:set>
-                                  </p:childTnLst>
-                                </p:cTn>
-                              </p:par>
-                            </p:childTnLst>
-                          </p:cTn>
-                        </p:par>
-                      </p:childTnLst>
-                    </p:cTn>
-                  </p:par>
-                </p:childTnLst>
-              </p:cTn>
-              <p:prevCondLst>
-                <p:cond evt="onPrev" delay="0">
-                  <p:tgtEl>
-                    <p:sldTgt/>
-                  </p:tgtEl>
-                </p:cond>
-              </p:prevCondLst>
-              <p:nextCondLst>
-                <p:cond evt="onNext" delay="0">
-                  <p:tgtEl>
-                    <p:sldTgt/>
-                  </p:tgtEl>
-                </p:cond>
-              </p:nextCondLst>
-            </p:seq>
-          </p:childTnLst>
-        </p:cTn>
-      </p:par>
-    </p:tnLst>
-    <p:bldLst>
-      <p:bldP spid="10" grpId="0" animBg="1"/>
-      <p:bldP spid="10" grpId="1" animBg="1"/>
     </p:bldLst>
   </p:timing>
 </p:sld>

</xml_diff>